<commit_message>
add diff in shell and exec in ppt
</commit_message>
<xml_diff>
--- a/EC-SSHE intro.pptx
+++ b/EC-SSHE intro.pptx
@@ -4,6 +4,9 @@
   <p:sldMasterIdLst>
     <p:sldMasterId id="2147483648" r:id="rId1"/>
   </p:sldMasterIdLst>
+  <p:notesMasterIdLst>
+    <p:notesMasterId r:id="rId18"/>
+  </p:notesMasterIdLst>
   <p:sldIdLst>
     <p:sldId id="256" r:id="rId2"/>
     <p:sldId id="267" r:id="rId3"/>
@@ -17,9 +20,10 @@
     <p:sldId id="264" r:id="rId11"/>
     <p:sldId id="265" r:id="rId12"/>
     <p:sldId id="266" r:id="rId13"/>
-    <p:sldId id="268" r:id="rId14"/>
-    <p:sldId id="269" r:id="rId15"/>
-    <p:sldId id="270" r:id="rId16"/>
+    <p:sldId id="271" r:id="rId14"/>
+    <p:sldId id="268" r:id="rId15"/>
+    <p:sldId id="269" r:id="rId16"/>
+    <p:sldId id="270" r:id="rId17"/>
   </p:sldIdLst>
   <p:sldSz cx="12192000" cy="6858000"/>
   <p:notesSz cx="6858000" cy="9144000"/>
@@ -121,6 +125,796 @@
 </p:presentation>
 </file>
 
+<file path=ppt/notesMasters/notesMaster1.xml><?xml version="1.0" encoding="utf-8"?>
+<p:notesMaster xmlns:a="http://schemas.openxmlformats.org/drawingml/2006/main" xmlns:r="http://schemas.openxmlformats.org/officeDocument/2006/relationships" xmlns:p="http://schemas.openxmlformats.org/presentationml/2006/main">
+  <p:cSld>
+    <p:bg>
+      <p:bgRef idx="1001">
+        <a:schemeClr val="bg1"/>
+      </p:bgRef>
+    </p:bg>
+    <p:spTree>
+      <p:nvGrpSpPr>
+        <p:cNvPr id="1" name=""/>
+        <p:cNvGrpSpPr/>
+        <p:nvPr/>
+      </p:nvGrpSpPr>
+      <p:grpSpPr>
+        <a:xfrm>
+          <a:off x="0" y="0"/>
+          <a:ext cx="0" cy="0"/>
+          <a:chOff x="0" y="0"/>
+          <a:chExt cx="0" cy="0"/>
+        </a:xfrm>
+      </p:grpSpPr>
+      <p:sp>
+        <p:nvSpPr>
+          <p:cNvPr id="2" name="页眉占位符 1"/>
+          <p:cNvSpPr>
+            <a:spLocks noGrp="1"/>
+          </p:cNvSpPr>
+          <p:nvPr>
+            <p:ph type="hdr" sz="quarter"/>
+          </p:nvPr>
+        </p:nvSpPr>
+        <p:spPr>
+          <a:xfrm>
+            <a:off x="0" y="0"/>
+            <a:ext cx="2971800" cy="457200"/>
+          </a:xfrm>
+          <a:prstGeom prst="rect">
+            <a:avLst/>
+          </a:prstGeom>
+        </p:spPr>
+        <p:txBody>
+          <a:bodyPr vert="horz" lIns="91440" tIns="45720" rIns="91440" bIns="45720" rtlCol="0"/>
+          <a:lstStyle>
+            <a:lvl1pPr algn="l">
+              <a:defRPr sz="1200"/>
+            </a:lvl1pPr>
+          </a:lstStyle>
+          <a:p>
+            <a:endParaRPr kumimoji="1" lang="zh-CN" altLang="en-US"/>
+          </a:p>
+        </p:txBody>
+      </p:sp>
+      <p:sp>
+        <p:nvSpPr>
+          <p:cNvPr id="3" name="日期占位符 2"/>
+          <p:cNvSpPr>
+            <a:spLocks noGrp="1"/>
+          </p:cNvSpPr>
+          <p:nvPr>
+            <p:ph type="dt" idx="1"/>
+          </p:nvPr>
+        </p:nvSpPr>
+        <p:spPr>
+          <a:xfrm>
+            <a:off x="3884613" y="0"/>
+            <a:ext cx="2971800" cy="457200"/>
+          </a:xfrm>
+          <a:prstGeom prst="rect">
+            <a:avLst/>
+          </a:prstGeom>
+        </p:spPr>
+        <p:txBody>
+          <a:bodyPr vert="horz" lIns="91440" tIns="45720" rIns="91440" bIns="45720" rtlCol="0"/>
+          <a:lstStyle>
+            <a:lvl1pPr algn="r">
+              <a:defRPr sz="1200"/>
+            </a:lvl1pPr>
+          </a:lstStyle>
+          <a:p>
+            <a:fld id="{85AB73B5-4C5F-5942-9314-C06023C076FD}" type="datetimeFigureOut">
+              <a:rPr kumimoji="1" lang="zh-CN" altLang="en-US" smtClean="0"/>
+              <a:t>13-8-27</a:t>
+            </a:fld>
+            <a:endParaRPr kumimoji="1" lang="zh-CN" altLang="en-US"/>
+          </a:p>
+        </p:txBody>
+      </p:sp>
+      <p:sp>
+        <p:nvSpPr>
+          <p:cNvPr id="4" name="幻灯片图像占位符 3"/>
+          <p:cNvSpPr>
+            <a:spLocks noGrp="1" noRot="1" noChangeAspect="1"/>
+          </p:cNvSpPr>
+          <p:nvPr>
+            <p:ph type="sldImg" idx="2"/>
+          </p:nvPr>
+        </p:nvSpPr>
+        <p:spPr>
+          <a:xfrm>
+            <a:off x="381000" y="685800"/>
+            <a:ext cx="6096000" cy="3429000"/>
+          </a:xfrm>
+          <a:prstGeom prst="rect">
+            <a:avLst/>
+          </a:prstGeom>
+          <a:noFill/>
+          <a:ln w="12700">
+            <a:solidFill>
+              <a:prstClr val="black"/>
+            </a:solidFill>
+          </a:ln>
+        </p:spPr>
+        <p:txBody>
+          <a:bodyPr vert="horz" lIns="91440" tIns="45720" rIns="91440" bIns="45720" rtlCol="0" anchor="ctr"/>
+          <a:lstStyle/>
+          <a:p>
+            <a:endParaRPr lang="zh-CN" altLang="en-US"/>
+          </a:p>
+        </p:txBody>
+      </p:sp>
+      <p:sp>
+        <p:nvSpPr>
+          <p:cNvPr id="5" name="备注占位符 4"/>
+          <p:cNvSpPr>
+            <a:spLocks noGrp="1"/>
+          </p:cNvSpPr>
+          <p:nvPr>
+            <p:ph type="body" sz="quarter" idx="3"/>
+          </p:nvPr>
+        </p:nvSpPr>
+        <p:spPr>
+          <a:xfrm>
+            <a:off x="685800" y="4343400"/>
+            <a:ext cx="5486400" cy="4114800"/>
+          </a:xfrm>
+          <a:prstGeom prst="rect">
+            <a:avLst/>
+          </a:prstGeom>
+        </p:spPr>
+        <p:txBody>
+          <a:bodyPr vert="horz" lIns="91440" tIns="45720" rIns="91440" bIns="45720" rtlCol="0"/>
+          <a:lstStyle/>
+          <a:p>
+            <a:pPr lvl="0"/>
+            <a:r>
+              <a:rPr kumimoji="1" lang="zh-CN" altLang="en-US" smtClean="0"/>
+              <a:t>单击此处编辑母版文本样式</a:t>
+            </a:r>
+          </a:p>
+          <a:p>
+            <a:pPr lvl="1"/>
+            <a:r>
+              <a:rPr kumimoji="1" lang="zh-CN" altLang="en-US" smtClean="0"/>
+              <a:t>二级</a:t>
+            </a:r>
+          </a:p>
+          <a:p>
+            <a:pPr lvl="2"/>
+            <a:r>
+              <a:rPr kumimoji="1" lang="zh-CN" altLang="en-US" smtClean="0"/>
+              <a:t>三级</a:t>
+            </a:r>
+          </a:p>
+          <a:p>
+            <a:pPr lvl="3"/>
+            <a:r>
+              <a:rPr kumimoji="1" lang="zh-CN" altLang="en-US" smtClean="0"/>
+              <a:t>四级</a:t>
+            </a:r>
+          </a:p>
+          <a:p>
+            <a:pPr lvl="4"/>
+            <a:r>
+              <a:rPr kumimoji="1" lang="zh-CN" altLang="en-US" smtClean="0"/>
+              <a:t>五级</a:t>
+            </a:r>
+            <a:endParaRPr kumimoji="1" lang="zh-CN" altLang="en-US"/>
+          </a:p>
+        </p:txBody>
+      </p:sp>
+      <p:sp>
+        <p:nvSpPr>
+          <p:cNvPr id="6" name="页脚占位符 5"/>
+          <p:cNvSpPr>
+            <a:spLocks noGrp="1"/>
+          </p:cNvSpPr>
+          <p:nvPr>
+            <p:ph type="ftr" sz="quarter" idx="4"/>
+          </p:nvPr>
+        </p:nvSpPr>
+        <p:spPr>
+          <a:xfrm>
+            <a:off x="0" y="8685213"/>
+            <a:ext cx="2971800" cy="457200"/>
+          </a:xfrm>
+          <a:prstGeom prst="rect">
+            <a:avLst/>
+          </a:prstGeom>
+        </p:spPr>
+        <p:txBody>
+          <a:bodyPr vert="horz" lIns="91440" tIns="45720" rIns="91440" bIns="45720" rtlCol="0" anchor="b"/>
+          <a:lstStyle>
+            <a:lvl1pPr algn="l">
+              <a:defRPr sz="1200"/>
+            </a:lvl1pPr>
+          </a:lstStyle>
+          <a:p>
+            <a:endParaRPr kumimoji="1" lang="zh-CN" altLang="en-US"/>
+          </a:p>
+        </p:txBody>
+      </p:sp>
+      <p:sp>
+        <p:nvSpPr>
+          <p:cNvPr id="7" name="幻灯片编号占位符 6"/>
+          <p:cNvSpPr>
+            <a:spLocks noGrp="1"/>
+          </p:cNvSpPr>
+          <p:nvPr>
+            <p:ph type="sldNum" sz="quarter" idx="5"/>
+          </p:nvPr>
+        </p:nvSpPr>
+        <p:spPr>
+          <a:xfrm>
+            <a:off x="3884613" y="8685213"/>
+            <a:ext cx="2971800" cy="457200"/>
+          </a:xfrm>
+          <a:prstGeom prst="rect">
+            <a:avLst/>
+          </a:prstGeom>
+        </p:spPr>
+        <p:txBody>
+          <a:bodyPr vert="horz" lIns="91440" tIns="45720" rIns="91440" bIns="45720" rtlCol="0" anchor="b"/>
+          <a:lstStyle>
+            <a:lvl1pPr algn="r">
+              <a:defRPr sz="1200"/>
+            </a:lvl1pPr>
+          </a:lstStyle>
+          <a:p>
+            <a:fld id="{1AD14BFC-5893-394B-8154-78E461D54B60}" type="slidenum">
+              <a:rPr kumimoji="1" lang="zh-CN" altLang="en-US" smtClean="0"/>
+              <a:t>‹#›</a:t>
+            </a:fld>
+            <a:endParaRPr kumimoji="1" lang="zh-CN" altLang="en-US"/>
+          </a:p>
+        </p:txBody>
+      </p:sp>
+    </p:spTree>
+    <p:extLst>
+      <p:ext uri="{BB962C8B-B14F-4D97-AF65-F5344CB8AC3E}">
+        <p14:creationId xmlns:p14="http://schemas.microsoft.com/office/powerpoint/2010/main" val="947315740"/>
+      </p:ext>
+    </p:extLst>
+  </p:cSld>
+  <p:clrMap bg1="lt1" tx1="dk1" bg2="lt2" tx2="dk2" accent1="accent1" accent2="accent2" accent3="accent3" accent4="accent4" accent5="accent5" accent6="accent6" hlink="hlink" folHlink="folHlink"/>
+  <p:notesStyle>
+    <a:lvl1pPr marL="0" algn="l" defTabSz="457200" rtl="0" eaLnBrk="1" latinLnBrk="0" hangingPunct="1">
+      <a:defRPr sz="1200" kern="1200">
+        <a:solidFill>
+          <a:schemeClr val="tx1"/>
+        </a:solidFill>
+        <a:latin typeface="+mn-lt"/>
+        <a:ea typeface="+mn-ea"/>
+        <a:cs typeface="+mn-cs"/>
+      </a:defRPr>
+    </a:lvl1pPr>
+    <a:lvl2pPr marL="457200" algn="l" defTabSz="457200" rtl="0" eaLnBrk="1" latinLnBrk="0" hangingPunct="1">
+      <a:defRPr sz="1200" kern="1200">
+        <a:solidFill>
+          <a:schemeClr val="tx1"/>
+        </a:solidFill>
+        <a:latin typeface="+mn-lt"/>
+        <a:ea typeface="+mn-ea"/>
+        <a:cs typeface="+mn-cs"/>
+      </a:defRPr>
+    </a:lvl2pPr>
+    <a:lvl3pPr marL="914400" algn="l" defTabSz="457200" rtl="0" eaLnBrk="1" latinLnBrk="0" hangingPunct="1">
+      <a:defRPr sz="1200" kern="1200">
+        <a:solidFill>
+          <a:schemeClr val="tx1"/>
+        </a:solidFill>
+        <a:latin typeface="+mn-lt"/>
+        <a:ea typeface="+mn-ea"/>
+        <a:cs typeface="+mn-cs"/>
+      </a:defRPr>
+    </a:lvl3pPr>
+    <a:lvl4pPr marL="1371600" algn="l" defTabSz="457200" rtl="0" eaLnBrk="1" latinLnBrk="0" hangingPunct="1">
+      <a:defRPr sz="1200" kern="1200">
+        <a:solidFill>
+          <a:schemeClr val="tx1"/>
+        </a:solidFill>
+        <a:latin typeface="+mn-lt"/>
+        <a:ea typeface="+mn-ea"/>
+        <a:cs typeface="+mn-cs"/>
+      </a:defRPr>
+    </a:lvl4pPr>
+    <a:lvl5pPr marL="1828800" algn="l" defTabSz="457200" rtl="0" eaLnBrk="1" latinLnBrk="0" hangingPunct="1">
+      <a:defRPr sz="1200" kern="1200">
+        <a:solidFill>
+          <a:schemeClr val="tx1"/>
+        </a:solidFill>
+        <a:latin typeface="+mn-lt"/>
+        <a:ea typeface="+mn-ea"/>
+        <a:cs typeface="+mn-cs"/>
+      </a:defRPr>
+    </a:lvl5pPr>
+    <a:lvl6pPr marL="2286000" algn="l" defTabSz="457200" rtl="0" eaLnBrk="1" latinLnBrk="0" hangingPunct="1">
+      <a:defRPr sz="1200" kern="1200">
+        <a:solidFill>
+          <a:schemeClr val="tx1"/>
+        </a:solidFill>
+        <a:latin typeface="+mn-lt"/>
+        <a:ea typeface="+mn-ea"/>
+        <a:cs typeface="+mn-cs"/>
+      </a:defRPr>
+    </a:lvl6pPr>
+    <a:lvl7pPr marL="2743200" algn="l" defTabSz="457200" rtl="0" eaLnBrk="1" latinLnBrk="0" hangingPunct="1">
+      <a:defRPr sz="1200" kern="1200">
+        <a:solidFill>
+          <a:schemeClr val="tx1"/>
+        </a:solidFill>
+        <a:latin typeface="+mn-lt"/>
+        <a:ea typeface="+mn-ea"/>
+        <a:cs typeface="+mn-cs"/>
+      </a:defRPr>
+    </a:lvl7pPr>
+    <a:lvl8pPr marL="3200400" algn="l" defTabSz="457200" rtl="0" eaLnBrk="1" latinLnBrk="0" hangingPunct="1">
+      <a:defRPr sz="1200" kern="1200">
+        <a:solidFill>
+          <a:schemeClr val="tx1"/>
+        </a:solidFill>
+        <a:latin typeface="+mn-lt"/>
+        <a:ea typeface="+mn-ea"/>
+        <a:cs typeface="+mn-cs"/>
+      </a:defRPr>
+    </a:lvl8pPr>
+    <a:lvl9pPr marL="3657600" algn="l" defTabSz="457200" rtl="0" eaLnBrk="1" latinLnBrk="0" hangingPunct="1">
+      <a:defRPr sz="1200" kern="1200">
+        <a:solidFill>
+          <a:schemeClr val="tx1"/>
+        </a:solidFill>
+        <a:latin typeface="+mn-lt"/>
+        <a:ea typeface="+mn-ea"/>
+        <a:cs typeface="+mn-cs"/>
+      </a:defRPr>
+    </a:lvl9pPr>
+  </p:notesStyle>
+</p:notesMaster>
+</file>
+
+<file path=ppt/notesSlides/notesSlide1.xml><?xml version="1.0" encoding="utf-8"?>
+<p:notes xmlns:a="http://schemas.openxmlformats.org/drawingml/2006/main" xmlns:r="http://schemas.openxmlformats.org/officeDocument/2006/relationships" xmlns:p="http://schemas.openxmlformats.org/presentationml/2006/main">
+  <p:cSld>
+    <p:spTree>
+      <p:nvGrpSpPr>
+        <p:cNvPr id="1" name=""/>
+        <p:cNvGrpSpPr/>
+        <p:nvPr/>
+      </p:nvGrpSpPr>
+      <p:grpSpPr>
+        <a:xfrm>
+          <a:off x="0" y="0"/>
+          <a:ext cx="0" cy="0"/>
+          <a:chOff x="0" y="0"/>
+          <a:chExt cx="0" cy="0"/>
+        </a:xfrm>
+      </p:grpSpPr>
+      <p:sp>
+        <p:nvSpPr>
+          <p:cNvPr id="2" name="幻灯片图像占位符 1"/>
+          <p:cNvSpPr>
+            <a:spLocks noGrp="1" noRot="1" noChangeAspect="1"/>
+          </p:cNvSpPr>
+          <p:nvPr>
+            <p:ph type="sldImg"/>
+          </p:nvPr>
+        </p:nvSpPr>
+        <p:spPr/>
+      </p:sp>
+      <p:sp>
+        <p:nvSpPr>
+          <p:cNvPr id="3" name="备注占位符 2"/>
+          <p:cNvSpPr>
+            <a:spLocks noGrp="1"/>
+          </p:cNvSpPr>
+          <p:nvPr>
+            <p:ph type="body" idx="1"/>
+          </p:nvPr>
+        </p:nvSpPr>
+        <p:spPr/>
+        <p:txBody>
+          <a:bodyPr/>
+          <a:lstStyle/>
+          <a:p>
+            <a:r>
+              <a:rPr kumimoji="1" lang="en-US" altLang="zh-CN" dirty="0" smtClean="0"/>
+              <a:t>The shell and exec channels are quite similar - both execute commands with the remote shell (at least, conceptually - the server might be configured to treat them differently, of course). RFC 4254 groups them in the section "Interactive Sessions", and they both (as well as subsystem, see below) use the channel type "session" in the SSH protocol.</a:t>
+            </a:r>
+          </a:p>
+          <a:p>
+            <a:endParaRPr kumimoji="1" lang="en-US" altLang="zh-CN" dirty="0" smtClean="0"/>
+          </a:p>
+          <a:p>
+            <a:r>
+              <a:rPr kumimoji="1" lang="en-US" altLang="zh-CN" dirty="0" smtClean="0"/>
+              <a:t>There is one important difference:</a:t>
+            </a:r>
+          </a:p>
+          <a:p>
+            <a:endParaRPr kumimoji="1" lang="en-US" altLang="zh-CN" dirty="0" smtClean="0"/>
+          </a:p>
+          <a:p>
+            <a:r>
+              <a:rPr kumimoji="1" lang="en-US" altLang="zh-CN" dirty="0" smtClean="0"/>
+              <a:t>For </a:t>
+            </a:r>
+            <a:r>
+              <a:rPr kumimoji="1" lang="en-US" altLang="zh-CN" dirty="0" err="1" smtClean="0"/>
+              <a:t>ChannelShell</a:t>
+            </a:r>
+            <a:r>
+              <a:rPr kumimoji="1" lang="en-US" altLang="zh-CN" dirty="0" smtClean="0"/>
+              <a:t>, the input stream provides both the commands and input to these commands. This is like using an interactive shell on your local computer. (And it is normally used just for that: interactive use.)</a:t>
+            </a:r>
+          </a:p>
+          <a:p>
+            <a:endParaRPr kumimoji="1" lang="en-US" altLang="zh-CN" dirty="0" smtClean="0"/>
+          </a:p>
+          <a:p>
+            <a:r>
+              <a:rPr kumimoji="1" lang="en-US" altLang="zh-CN" dirty="0" smtClean="0"/>
+              <a:t>For </a:t>
+            </a:r>
+            <a:r>
+              <a:rPr kumimoji="1" lang="en-US" altLang="zh-CN" dirty="0" err="1" smtClean="0"/>
+              <a:t>ChannelExec</a:t>
+            </a:r>
+            <a:r>
+              <a:rPr kumimoji="1" lang="en-US" altLang="zh-CN" dirty="0" smtClean="0"/>
+              <a:t>, the commands are given with </a:t>
+            </a:r>
+            <a:r>
+              <a:rPr kumimoji="1" lang="en-US" altLang="zh-CN" dirty="0" err="1" smtClean="0"/>
+              <a:t>setCommand</a:t>
+            </a:r>
+            <a:r>
+              <a:rPr kumimoji="1" lang="en-US" altLang="zh-CN" dirty="0" smtClean="0"/>
+              <a:t>() before connect(), and the input stream will be sent to these commands as input. (Most often, you will have only one command, but you can provide multiple ones using the normal shell separators &amp;, &amp;&amp;, |, ||, ;, newline, and compound commands.) This is like executing a shell script on your local computer. (Of course, if one of the commands itself is an interactive shell, this will behave like a </a:t>
+            </a:r>
+            <a:r>
+              <a:rPr kumimoji="1" lang="en-US" altLang="zh-CN" dirty="0" err="1" smtClean="0"/>
+              <a:t>ChannelShell</a:t>
+            </a:r>
+            <a:r>
+              <a:rPr kumimoji="1" lang="en-US" altLang="zh-CN" dirty="0" smtClean="0"/>
+              <a:t>.)</a:t>
+            </a:r>
+          </a:p>
+          <a:p>
+            <a:endParaRPr kumimoji="1" lang="en-US" altLang="zh-CN" dirty="0" smtClean="0"/>
+          </a:p>
+          <a:p>
+            <a:r>
+              <a:rPr kumimoji="1" lang="en-US" altLang="zh-CN" dirty="0" smtClean="0"/>
+              <a:t>There is a third similar one, </a:t>
+            </a:r>
+            <a:r>
+              <a:rPr kumimoji="1" lang="en-US" altLang="zh-CN" dirty="0" err="1" smtClean="0"/>
+              <a:t>ChannelSubsystem</a:t>
+            </a:r>
+            <a:r>
+              <a:rPr kumimoji="1" lang="en-US" altLang="zh-CN" dirty="0" smtClean="0"/>
+              <a:t>, which executes a subsystem of the </a:t>
+            </a:r>
+            <a:r>
+              <a:rPr kumimoji="1" lang="en-US" altLang="zh-CN" dirty="0" err="1" smtClean="0"/>
+              <a:t>ssh</a:t>
+            </a:r>
+            <a:r>
+              <a:rPr kumimoji="1" lang="en-US" altLang="zh-CN" dirty="0" smtClean="0"/>
+              <a:t> server - here the server's configuration decides what to do, not the remote user's shell. (The most often used subsystem is </a:t>
+            </a:r>
+            <a:r>
+              <a:rPr kumimoji="1" lang="en-US" altLang="zh-CN" dirty="0" err="1" smtClean="0"/>
+              <a:t>sftp</a:t>
+            </a:r>
+            <a:r>
+              <a:rPr kumimoji="1" lang="en-US" altLang="zh-CN" dirty="0" smtClean="0"/>
+              <a:t>, but for this </a:t>
+            </a:r>
+            <a:r>
+              <a:rPr kumimoji="1" lang="en-US" altLang="zh-CN" dirty="0" err="1" smtClean="0"/>
+              <a:t>JSch</a:t>
+            </a:r>
+            <a:r>
+              <a:rPr kumimoji="1" lang="en-US" altLang="zh-CN" dirty="0" smtClean="0"/>
+              <a:t> provides a specialized channel, which understands the protocol.)</a:t>
+            </a:r>
+            <a:endParaRPr kumimoji="1" lang="zh-CN" altLang="en-US" dirty="0"/>
+          </a:p>
+        </p:txBody>
+      </p:sp>
+      <p:sp>
+        <p:nvSpPr>
+          <p:cNvPr id="4" name="幻灯片编号占位符 3"/>
+          <p:cNvSpPr>
+            <a:spLocks noGrp="1"/>
+          </p:cNvSpPr>
+          <p:nvPr>
+            <p:ph type="sldNum" sz="quarter" idx="10"/>
+          </p:nvPr>
+        </p:nvSpPr>
+        <p:spPr/>
+        <p:txBody>
+          <a:bodyPr/>
+          <a:lstStyle/>
+          <a:p>
+            <a:fld id="{1AD14BFC-5893-394B-8154-78E461D54B60}" type="slidenum">
+              <a:rPr kumimoji="1" lang="zh-CN" altLang="en-US" smtClean="0"/>
+              <a:t>13</a:t>
+            </a:fld>
+            <a:endParaRPr kumimoji="1" lang="zh-CN" altLang="en-US"/>
+          </a:p>
+        </p:txBody>
+      </p:sp>
+    </p:spTree>
+    <p:extLst>
+      <p:ext uri="{BB962C8B-B14F-4D97-AF65-F5344CB8AC3E}">
+        <p14:creationId xmlns:p14="http://schemas.microsoft.com/office/powerpoint/2010/main" val="4080515117"/>
+      </p:ext>
+    </p:extLst>
+  </p:cSld>
+  <p:clrMapOvr>
+    <a:masterClrMapping/>
+  </p:clrMapOvr>
+</p:notes>
+</file>
+
+<file path=ppt/notesSlides/notesSlide2.xml><?xml version="1.0" encoding="utf-8"?>
+<p:notes xmlns:a="http://schemas.openxmlformats.org/drawingml/2006/main" xmlns:r="http://schemas.openxmlformats.org/officeDocument/2006/relationships" xmlns:p="http://schemas.openxmlformats.org/presentationml/2006/main">
+  <p:cSld>
+    <p:spTree>
+      <p:nvGrpSpPr>
+        <p:cNvPr id="1" name=""/>
+        <p:cNvGrpSpPr/>
+        <p:nvPr/>
+      </p:nvGrpSpPr>
+      <p:grpSpPr>
+        <a:xfrm>
+          <a:off x="0" y="0"/>
+          <a:ext cx="0" cy="0"/>
+          <a:chOff x="0" y="0"/>
+          <a:chExt cx="0" cy="0"/>
+        </a:xfrm>
+      </p:grpSpPr>
+      <p:sp>
+        <p:nvSpPr>
+          <p:cNvPr id="2" name="幻灯片图像占位符 1"/>
+          <p:cNvSpPr>
+            <a:spLocks noGrp="1" noRot="1" noChangeAspect="1"/>
+          </p:cNvSpPr>
+          <p:nvPr>
+            <p:ph type="sldImg"/>
+          </p:nvPr>
+        </p:nvSpPr>
+        <p:spPr/>
+      </p:sp>
+      <p:sp>
+        <p:nvSpPr>
+          <p:cNvPr id="3" name="备注占位符 2"/>
+          <p:cNvSpPr>
+            <a:spLocks noGrp="1"/>
+          </p:cNvSpPr>
+          <p:nvPr>
+            <p:ph type="body" idx="1"/>
+          </p:nvPr>
+        </p:nvSpPr>
+        <p:spPr/>
+        <p:txBody>
+          <a:bodyPr/>
+          <a:lstStyle/>
+          <a:p>
+            <a:endParaRPr kumimoji="1" lang="zh-CN" altLang="en-US"/>
+          </a:p>
+        </p:txBody>
+      </p:sp>
+      <p:sp>
+        <p:nvSpPr>
+          <p:cNvPr id="4" name="幻灯片编号占位符 3"/>
+          <p:cNvSpPr>
+            <a:spLocks noGrp="1"/>
+          </p:cNvSpPr>
+          <p:nvPr>
+            <p:ph type="sldNum" sz="quarter" idx="10"/>
+          </p:nvPr>
+        </p:nvSpPr>
+        <p:spPr/>
+        <p:txBody>
+          <a:bodyPr/>
+          <a:lstStyle/>
+          <a:p>
+            <a:fld id="{1AD14BFC-5893-394B-8154-78E461D54B60}" type="slidenum">
+              <a:rPr kumimoji="1" lang="zh-CN" altLang="en-US" smtClean="0"/>
+              <a:t>14</a:t>
+            </a:fld>
+            <a:endParaRPr kumimoji="1" lang="zh-CN" altLang="en-US"/>
+          </a:p>
+        </p:txBody>
+      </p:sp>
+    </p:spTree>
+    <p:extLst>
+      <p:ext uri="{BB962C8B-B14F-4D97-AF65-F5344CB8AC3E}">
+        <p14:creationId xmlns:p14="http://schemas.microsoft.com/office/powerpoint/2010/main" val="3628924070"/>
+      </p:ext>
+    </p:extLst>
+  </p:cSld>
+  <p:clrMapOvr>
+    <a:masterClrMapping/>
+  </p:clrMapOvr>
+</p:notes>
+</file>
+
+<file path=ppt/notesSlides/notesSlide3.xml><?xml version="1.0" encoding="utf-8"?>
+<p:notes xmlns:a="http://schemas.openxmlformats.org/drawingml/2006/main" xmlns:r="http://schemas.openxmlformats.org/officeDocument/2006/relationships" xmlns:p="http://schemas.openxmlformats.org/presentationml/2006/main">
+  <p:cSld>
+    <p:spTree>
+      <p:nvGrpSpPr>
+        <p:cNvPr id="1" name=""/>
+        <p:cNvGrpSpPr/>
+        <p:nvPr/>
+      </p:nvGrpSpPr>
+      <p:grpSpPr>
+        <a:xfrm>
+          <a:off x="0" y="0"/>
+          <a:ext cx="0" cy="0"/>
+          <a:chOff x="0" y="0"/>
+          <a:chExt cx="0" cy="0"/>
+        </a:xfrm>
+      </p:grpSpPr>
+      <p:sp>
+        <p:nvSpPr>
+          <p:cNvPr id="2" name="幻灯片图像占位符 1"/>
+          <p:cNvSpPr>
+            <a:spLocks noGrp="1" noRot="1" noChangeAspect="1"/>
+          </p:cNvSpPr>
+          <p:nvPr>
+            <p:ph type="sldImg"/>
+          </p:nvPr>
+        </p:nvSpPr>
+        <p:spPr/>
+      </p:sp>
+      <p:sp>
+        <p:nvSpPr>
+          <p:cNvPr id="3" name="备注占位符 2"/>
+          <p:cNvSpPr>
+            <a:spLocks noGrp="1"/>
+          </p:cNvSpPr>
+          <p:nvPr>
+            <p:ph type="body" idx="1"/>
+          </p:nvPr>
+        </p:nvSpPr>
+        <p:spPr/>
+        <p:txBody>
+          <a:bodyPr/>
+          <a:lstStyle/>
+          <a:p>
+            <a:endParaRPr kumimoji="1" lang="zh-CN" altLang="en-US"/>
+          </a:p>
+        </p:txBody>
+      </p:sp>
+      <p:sp>
+        <p:nvSpPr>
+          <p:cNvPr id="4" name="幻灯片编号占位符 3"/>
+          <p:cNvSpPr>
+            <a:spLocks noGrp="1"/>
+          </p:cNvSpPr>
+          <p:nvPr>
+            <p:ph type="sldNum" sz="quarter" idx="10"/>
+          </p:nvPr>
+        </p:nvSpPr>
+        <p:spPr/>
+        <p:txBody>
+          <a:bodyPr/>
+          <a:lstStyle/>
+          <a:p>
+            <a:fld id="{1AD14BFC-5893-394B-8154-78E461D54B60}" type="slidenum">
+              <a:rPr kumimoji="1" lang="zh-CN" altLang="en-US" smtClean="0"/>
+              <a:t>15</a:t>
+            </a:fld>
+            <a:endParaRPr kumimoji="1" lang="zh-CN" altLang="en-US"/>
+          </a:p>
+        </p:txBody>
+      </p:sp>
+    </p:spTree>
+    <p:extLst>
+      <p:ext uri="{BB962C8B-B14F-4D97-AF65-F5344CB8AC3E}">
+        <p14:creationId xmlns:p14="http://schemas.microsoft.com/office/powerpoint/2010/main" val="567877383"/>
+      </p:ext>
+    </p:extLst>
+  </p:cSld>
+  <p:clrMapOvr>
+    <a:masterClrMapping/>
+  </p:clrMapOvr>
+</p:notes>
+</file>
+
+<file path=ppt/notesSlides/notesSlide4.xml><?xml version="1.0" encoding="utf-8"?>
+<p:notes xmlns:a="http://schemas.openxmlformats.org/drawingml/2006/main" xmlns:r="http://schemas.openxmlformats.org/officeDocument/2006/relationships" xmlns:p="http://schemas.openxmlformats.org/presentationml/2006/main">
+  <p:cSld>
+    <p:spTree>
+      <p:nvGrpSpPr>
+        <p:cNvPr id="1" name=""/>
+        <p:cNvGrpSpPr/>
+        <p:nvPr/>
+      </p:nvGrpSpPr>
+      <p:grpSpPr>
+        <a:xfrm>
+          <a:off x="0" y="0"/>
+          <a:ext cx="0" cy="0"/>
+          <a:chOff x="0" y="0"/>
+          <a:chExt cx="0" cy="0"/>
+        </a:xfrm>
+      </p:grpSpPr>
+      <p:sp>
+        <p:nvSpPr>
+          <p:cNvPr id="2" name="幻灯片图像占位符 1"/>
+          <p:cNvSpPr>
+            <a:spLocks noGrp="1" noRot="1" noChangeAspect="1"/>
+          </p:cNvSpPr>
+          <p:nvPr>
+            <p:ph type="sldImg"/>
+          </p:nvPr>
+        </p:nvSpPr>
+        <p:spPr/>
+      </p:sp>
+      <p:sp>
+        <p:nvSpPr>
+          <p:cNvPr id="3" name="备注占位符 2"/>
+          <p:cNvSpPr>
+            <a:spLocks noGrp="1"/>
+          </p:cNvSpPr>
+          <p:nvPr>
+            <p:ph type="body" idx="1"/>
+          </p:nvPr>
+        </p:nvSpPr>
+        <p:spPr/>
+        <p:txBody>
+          <a:bodyPr/>
+          <a:lstStyle/>
+          <a:p>
+            <a:endParaRPr kumimoji="1" lang="zh-CN" altLang="en-US"/>
+          </a:p>
+        </p:txBody>
+      </p:sp>
+      <p:sp>
+        <p:nvSpPr>
+          <p:cNvPr id="4" name="幻灯片编号占位符 3"/>
+          <p:cNvSpPr>
+            <a:spLocks noGrp="1"/>
+          </p:cNvSpPr>
+          <p:nvPr>
+            <p:ph type="sldNum" sz="quarter" idx="10"/>
+          </p:nvPr>
+        </p:nvSpPr>
+        <p:spPr/>
+        <p:txBody>
+          <a:bodyPr/>
+          <a:lstStyle/>
+          <a:p>
+            <a:fld id="{1AD14BFC-5893-394B-8154-78E461D54B60}" type="slidenum">
+              <a:rPr kumimoji="1" lang="zh-CN" altLang="en-US" smtClean="0"/>
+              <a:t>16</a:t>
+            </a:fld>
+            <a:endParaRPr kumimoji="1" lang="zh-CN" altLang="en-US"/>
+          </a:p>
+        </p:txBody>
+      </p:sp>
+    </p:spTree>
+    <p:extLst>
+      <p:ext uri="{BB962C8B-B14F-4D97-AF65-F5344CB8AC3E}">
+        <p14:creationId xmlns:p14="http://schemas.microsoft.com/office/powerpoint/2010/main" val="1435783446"/>
+      </p:ext>
+    </p:extLst>
+  </p:cSld>
+  <p:clrMapOvr>
+    <a:masterClrMapping/>
+  </p:clrMapOvr>
+</p:notes>
+</file>
+
 <file path=ppt/slideLayouts/slideLayout1.xml><?xml version="1.0" encoding="utf-8"?>
 <p:sldLayout xmlns:a="http://schemas.openxmlformats.org/drawingml/2006/main" xmlns:r="http://schemas.openxmlformats.org/officeDocument/2006/relationships" xmlns:p="http://schemas.openxmlformats.org/presentationml/2006/main" type="title" preserve="1">
   <p:cSld name="标题幻灯片">
@@ -252,7 +1046,7 @@
           <a:p>
             <a:fld id="{646AEFEC-D4CF-404A-A7BE-D5681A3384B3}" type="datetimeFigureOut">
               <a:rPr lang="zh-CN" altLang="en-US" smtClean="0"/>
-              <a:t>2013/8/26</a:t>
+              <a:t>13-8-27</a:t>
             </a:fld>
             <a:endParaRPr lang="zh-CN" altLang="en-US"/>
           </a:p>
@@ -422,7 +1216,7 @@
           <a:p>
             <a:fld id="{646AEFEC-D4CF-404A-A7BE-D5681A3384B3}" type="datetimeFigureOut">
               <a:rPr lang="zh-CN" altLang="en-US" smtClean="0"/>
-              <a:t>2013/8/26</a:t>
+              <a:t>13-8-27</a:t>
             </a:fld>
             <a:endParaRPr lang="zh-CN" altLang="en-US"/>
           </a:p>
@@ -602,7 +1396,7 @@
           <a:p>
             <a:fld id="{646AEFEC-D4CF-404A-A7BE-D5681A3384B3}" type="datetimeFigureOut">
               <a:rPr lang="zh-CN" altLang="en-US" smtClean="0"/>
-              <a:t>2013/8/26</a:t>
+              <a:t>13-8-27</a:t>
             </a:fld>
             <a:endParaRPr lang="zh-CN" altLang="en-US"/>
           </a:p>
@@ -772,7 +1566,7 @@
           <a:p>
             <a:fld id="{646AEFEC-D4CF-404A-A7BE-D5681A3384B3}" type="datetimeFigureOut">
               <a:rPr lang="zh-CN" altLang="en-US" smtClean="0"/>
-              <a:t>2013/8/26</a:t>
+              <a:t>13-8-27</a:t>
             </a:fld>
             <a:endParaRPr lang="zh-CN" altLang="en-US"/>
           </a:p>
@@ -1018,7 +1812,7 @@
           <a:p>
             <a:fld id="{646AEFEC-D4CF-404A-A7BE-D5681A3384B3}" type="datetimeFigureOut">
               <a:rPr lang="zh-CN" altLang="en-US" smtClean="0"/>
-              <a:t>2013/8/26</a:t>
+              <a:t>13-8-27</a:t>
             </a:fld>
             <a:endParaRPr lang="zh-CN" altLang="en-US"/>
           </a:p>
@@ -1250,7 +2044,7 @@
           <a:p>
             <a:fld id="{646AEFEC-D4CF-404A-A7BE-D5681A3384B3}" type="datetimeFigureOut">
               <a:rPr lang="zh-CN" altLang="en-US" smtClean="0"/>
-              <a:t>2013/8/26</a:t>
+              <a:t>13-8-27</a:t>
             </a:fld>
             <a:endParaRPr lang="zh-CN" altLang="en-US"/>
           </a:p>
@@ -1617,7 +2411,7 @@
           <a:p>
             <a:fld id="{646AEFEC-D4CF-404A-A7BE-D5681A3384B3}" type="datetimeFigureOut">
               <a:rPr lang="zh-CN" altLang="en-US" smtClean="0"/>
-              <a:t>2013/8/26</a:t>
+              <a:t>13-8-27</a:t>
             </a:fld>
             <a:endParaRPr lang="zh-CN" altLang="en-US"/>
           </a:p>
@@ -1735,7 +2529,7 @@
           <a:p>
             <a:fld id="{646AEFEC-D4CF-404A-A7BE-D5681A3384B3}" type="datetimeFigureOut">
               <a:rPr lang="zh-CN" altLang="en-US" smtClean="0"/>
-              <a:t>2013/8/26</a:t>
+              <a:t>13-8-27</a:t>
             </a:fld>
             <a:endParaRPr lang="zh-CN" altLang="en-US"/>
           </a:p>
@@ -1830,7 +2624,7 @@
           <a:p>
             <a:fld id="{646AEFEC-D4CF-404A-A7BE-D5681A3384B3}" type="datetimeFigureOut">
               <a:rPr lang="zh-CN" altLang="en-US" smtClean="0"/>
-              <a:t>2013/8/26</a:t>
+              <a:t>13-8-27</a:t>
             </a:fld>
             <a:endParaRPr lang="zh-CN" altLang="en-US"/>
           </a:p>
@@ -2107,7 +2901,7 @@
           <a:p>
             <a:fld id="{646AEFEC-D4CF-404A-A7BE-D5681A3384B3}" type="datetimeFigureOut">
               <a:rPr lang="zh-CN" altLang="en-US" smtClean="0"/>
-              <a:t>2013/8/26</a:t>
+              <a:t>13-8-27</a:t>
             </a:fld>
             <a:endParaRPr lang="zh-CN" altLang="en-US"/>
           </a:p>
@@ -2360,7 +3154,7 @@
           <a:p>
             <a:fld id="{646AEFEC-D4CF-404A-A7BE-D5681A3384B3}" type="datetimeFigureOut">
               <a:rPr lang="zh-CN" altLang="en-US" smtClean="0"/>
-              <a:t>2013/8/26</a:t>
+              <a:t>13-8-27</a:t>
             </a:fld>
             <a:endParaRPr lang="zh-CN" altLang="en-US"/>
           </a:p>
@@ -2573,7 +3367,7 @@
           <a:p>
             <a:fld id="{646AEFEC-D4CF-404A-A7BE-D5681A3384B3}" type="datetimeFigureOut">
               <a:rPr lang="zh-CN" altLang="en-US" smtClean="0"/>
-              <a:t>2013/8/26</a:t>
+              <a:t>13-8-27</a:t>
             </a:fld>
             <a:endParaRPr lang="zh-CN" altLang="en-US"/>
           </a:p>
@@ -3037,7 +3831,7 @@
   <p:timing>
     <p:tnLst>
       <p:par>
-        <p:cTn id="1" dur="indefinite" restart="never" nodeType="tmRoot"/>
+        <p:cTn xmlns:p14="http://schemas.microsoft.com/office/powerpoint/2010/main" id="1" dur="indefinite" restart="never" nodeType="tmRoot"/>
       </p:par>
     </p:tnLst>
   </p:timing>
@@ -3243,7 +4037,7 @@
   <p:timing>
     <p:tnLst>
       <p:par>
-        <p:cTn id="1" dur="indefinite" restart="never" nodeType="tmRoot">
+        <p:cTn xmlns:p14="http://schemas.microsoft.com/office/powerpoint/2010/main" id="1" dur="indefinite" restart="never" nodeType="tmRoot">
           <p:childTnLst>
             <p:seq concurrent="1" nextAc="seek">
               <p:cTn id="2" dur="indefinite" nodeType="mainSeq">
@@ -3608,11 +4402,7 @@
             </a:r>
             <a:r>
               <a:rPr lang="en-US" altLang="zh-CN" dirty="0" smtClean="0"/>
-              <a:t>: </a:t>
-            </a:r>
-            <a:r>
-              <a:rPr lang="en-US" altLang="zh-CN" dirty="0" smtClean="0"/>
-              <a:t>java -jar ec-sshe-x.x.x.jar  -f </a:t>
+              <a:t>: java -jar ec-sshe-x.x.x.jar  -f </a:t>
             </a:r>
             <a:r>
               <a:rPr lang="en-US" altLang="zh-CN" dirty="0" err="1" smtClean="0"/>
@@ -3639,7 +4429,7 @@
   <p:timing>
     <p:tnLst>
       <p:par>
-        <p:cTn id="1" dur="indefinite" restart="never" nodeType="tmRoot">
+        <p:cTn xmlns:p14="http://schemas.microsoft.com/office/powerpoint/2010/main" id="1" dur="indefinite" restart="never" nodeType="tmRoot">
           <p:childTnLst>
             <p:seq concurrent="1" nextAc="seek">
               <p:cTn id="2" dur="indefinite" nodeType="mainSeq">
@@ -4097,7 +4887,7 @@
   <p:timing>
     <p:tnLst>
       <p:par>
-        <p:cTn id="1" dur="indefinite" restart="never" nodeType="tmRoot">
+        <p:cTn xmlns:p14="http://schemas.microsoft.com/office/powerpoint/2010/main" id="1" dur="indefinite" restart="never" nodeType="tmRoot">
           <p:childTnLst>
             <p:seq concurrent="1" nextAc="seek">
               <p:cTn id="2" dur="indefinite" nodeType="mainSeq">
@@ -4466,52 +5256,170 @@
             <p:ph type="title"/>
           </p:nvPr>
         </p:nvSpPr>
-        <p:spPr>
-          <a:xfrm>
-            <a:off x="838200" y="365125"/>
-            <a:ext cx="11353800" cy="1325563"/>
-          </a:xfrm>
-        </p:spPr>
+        <p:spPr/>
         <p:txBody>
           <a:bodyPr/>
           <a:lstStyle/>
           <a:p>
             <a:r>
-              <a:rPr lang="zh-CN" altLang="en-US" dirty="0" smtClean="0"/>
-              <a:t>演示</a:t>
-            </a:r>
-            <a:r>
-              <a:rPr lang="en-US" altLang="zh-CN" dirty="0" smtClean="0"/>
-              <a:t>1</a:t>
-            </a:r>
-            <a:r>
-              <a:rPr lang="zh-CN" altLang="en-US" dirty="0" smtClean="0"/>
-              <a:t>：商城</a:t>
-            </a:r>
-            <a:r>
-              <a:rPr lang="en-US" altLang="zh-CN" dirty="0" smtClean="0"/>
-              <a:t>25</a:t>
-            </a:r>
-            <a:r>
-              <a:rPr lang="zh-CN" altLang="en-US" dirty="0" smtClean="0"/>
-              <a:t>台主机部署</a:t>
-            </a:r>
-            <a:r>
-              <a:rPr lang="en-US" altLang="zh-CN" dirty="0" smtClean="0"/>
-              <a:t>flume</a:t>
-            </a:r>
-            <a:r>
-              <a:rPr lang="zh-CN" altLang="en-US" dirty="0" smtClean="0"/>
-              <a:t>的</a:t>
-            </a:r>
-            <a:r>
-              <a:rPr lang="en-US" altLang="zh-CN" dirty="0" err="1" smtClean="0"/>
-              <a:t>sshe</a:t>
-            </a:r>
-            <a:r>
-              <a:rPr lang="zh-CN" altLang="en-US" dirty="0"/>
-              <a:t>配置</a:t>
-            </a:r>
+              <a:rPr kumimoji="1" lang="en-US" altLang="zh-CN" dirty="0" smtClean="0"/>
+              <a:t>FAQ</a:t>
+            </a:r>
+            <a:r>
+              <a:rPr kumimoji="1" lang="en-US" altLang="zh-CN" dirty="0" smtClean="0"/>
+              <a:t> 5: </a:t>
+            </a:r>
+            <a:r>
+              <a:rPr kumimoji="1" lang="en-US" altLang="zh-CN" dirty="0" err="1" smtClean="0"/>
+              <a:t>cmdType</a:t>
+            </a:r>
+            <a:r>
+              <a:rPr kumimoji="1" lang="zh-CN" altLang="en-US" dirty="0" smtClean="0"/>
+              <a:t>之</a:t>
+            </a:r>
+            <a:r>
+              <a:rPr kumimoji="1" lang="en-US" altLang="zh-CN" dirty="0" smtClean="0"/>
+              <a:t>exec</a:t>
+            </a:r>
+            <a:r>
+              <a:rPr kumimoji="1" lang="zh-CN" altLang="en-US" dirty="0" smtClean="0"/>
+              <a:t>与</a:t>
+            </a:r>
+            <a:r>
+              <a:rPr kumimoji="1" lang="en-US" altLang="zh-CN" dirty="0" smtClean="0"/>
+              <a:t>shell</a:t>
+            </a:r>
+            <a:r>
+              <a:rPr kumimoji="1" lang="zh-CN" altLang="en-US" dirty="0" smtClean="0"/>
+              <a:t>区别</a:t>
+            </a:r>
+            <a:endParaRPr kumimoji="1" lang="zh-CN" altLang="en-US" dirty="0"/>
+          </a:p>
+        </p:txBody>
+      </p:sp>
+      <p:sp>
+        <p:nvSpPr>
+          <p:cNvPr id="3" name="内容占位符 2"/>
+          <p:cNvSpPr>
+            <a:spLocks noGrp="1"/>
+          </p:cNvSpPr>
+          <p:nvPr>
+            <p:ph idx="1"/>
+          </p:nvPr>
+        </p:nvSpPr>
+        <p:spPr/>
+        <p:txBody>
+          <a:bodyPr/>
+          <a:lstStyle/>
+          <a:p>
+            <a:r>
+              <a:rPr kumimoji="1" lang="en-US" altLang="zh-CN" dirty="0" smtClean="0"/>
+              <a:t>exec</a:t>
+            </a:r>
+            <a:r>
+              <a:rPr kumimoji="1" lang="zh-CN" altLang="en-US" dirty="0" smtClean="0"/>
+              <a:t>无上下文保持，每条命令独立；</a:t>
+            </a:r>
+            <a:r>
+              <a:rPr kumimoji="1" lang="en-US" altLang="zh-CN" dirty="0" smtClean="0"/>
+              <a:t>shell</a:t>
+            </a:r>
+            <a:r>
+              <a:rPr kumimoji="1" lang="zh-CN" altLang="en-US" dirty="0" smtClean="0"/>
+              <a:t>命令则保持上下文。</a:t>
+            </a:r>
+            <a:endParaRPr kumimoji="1" lang="en-US" altLang="zh-CN" dirty="0" smtClean="0"/>
+          </a:p>
+          <a:p>
+            <a:r>
+              <a:rPr kumimoji="1" lang="en-US" altLang="zh-CN" dirty="0" err="1"/>
+              <a:t>exec</a:t>
+            </a:r>
+            <a:r>
+              <a:rPr kumimoji="1" lang="en-US" altLang="en-US" dirty="0" err="1"/>
+              <a:t>不是所有命令</a:t>
+            </a:r>
+            <a:r>
+              <a:rPr kumimoji="1" lang="en-US" altLang="en-US" dirty="0" err="1" smtClean="0"/>
+              <a:t>都能执行</a:t>
+            </a:r>
+            <a:r>
+              <a:rPr kumimoji="1" lang="en-US" altLang="en-US" dirty="0" smtClean="0"/>
+              <a:t>(</a:t>
+            </a:r>
+            <a:r>
+              <a:rPr kumimoji="1" lang="en-US" altLang="en-US" dirty="0" err="1" smtClean="0"/>
+              <a:t>例如ll</a:t>
+            </a:r>
+            <a:r>
+              <a:rPr kumimoji="1" lang="en-US" altLang="en-US" dirty="0" smtClean="0"/>
+              <a:t>)， </a:t>
+            </a:r>
+            <a:r>
+              <a:rPr kumimoji="1" lang="en-US" altLang="en-US" dirty="0" err="1" smtClean="0"/>
+              <a:t>shell与普通终端操作相仿</a:t>
+            </a:r>
+            <a:r>
+              <a:rPr kumimoji="1" lang="en-US" altLang="en-US" dirty="0" smtClean="0"/>
+              <a:t>。</a:t>
+            </a:r>
+          </a:p>
+          <a:p>
+            <a:r>
+              <a:rPr kumimoji="1" lang="en-US" altLang="en-US" dirty="0" smtClean="0"/>
+              <a:t>执行速度差异巨大。</a:t>
+            </a:r>
+          </a:p>
+          <a:p>
+            <a:pPr lvl="1"/>
+            <a:r>
+              <a:rPr kumimoji="1" lang="en-US" altLang="en-US" dirty="0" smtClean="0"/>
+              <a:t>商城环境，执行24台机器的ps –</a:t>
+            </a:r>
+            <a:r>
+              <a:rPr kumimoji="1" lang="en-US" altLang="en-US" dirty="0" err="1" smtClean="0"/>
+              <a:t>ef|grep</a:t>
+            </a:r>
+            <a:r>
+              <a:rPr kumimoji="1" lang="en-US" altLang="en-US" dirty="0" smtClean="0"/>
+              <a:t>  </a:t>
+            </a:r>
+            <a:r>
+              <a:rPr kumimoji="1" lang="en-US" altLang="en-US" dirty="0" err="1" smtClean="0"/>
+              <a:t>flume命令</a:t>
+            </a:r>
+            <a:endParaRPr kumimoji="1" lang="en-US" altLang="en-US" dirty="0"/>
+          </a:p>
+          <a:p>
+            <a:pPr lvl="1"/>
+            <a:r>
+              <a:rPr kumimoji="1" lang="en-US" altLang="en-US" dirty="0" smtClean="0"/>
+              <a:t>exec方式只需要</a:t>
+            </a:r>
+            <a:r>
+              <a:rPr kumimoji="1" lang="en-US" altLang="en-US" b="1" dirty="0" smtClean="0">
+                <a:solidFill>
+                  <a:srgbClr val="FF0000"/>
+                </a:solidFill>
+              </a:rPr>
+              <a:t>2秒</a:t>
+            </a:r>
+            <a:r>
+              <a:rPr kumimoji="1" lang="en-US" altLang="en-US" dirty="0" smtClean="0"/>
+              <a:t>，shell方式需要</a:t>
+            </a:r>
+            <a:r>
+              <a:rPr kumimoji="1" lang="en-US" altLang="en-US" b="1" dirty="0" smtClean="0">
+                <a:solidFill>
+                  <a:srgbClr val="FF0000"/>
+                </a:solidFill>
+              </a:rPr>
+              <a:t>27秒</a:t>
+            </a:r>
+          </a:p>
+          <a:p>
+            <a:pPr lvl="1"/>
+            <a:endParaRPr kumimoji="1" lang="zh-CN" altLang="en-US" dirty="0"/>
           </a:p>
         </p:txBody>
       </p:sp>
@@ -4523,298 +5431,49 @@
         </p:nvSpPr>
         <p:spPr>
           <a:xfrm>
-            <a:off x="838200" y="1516943"/>
-            <a:ext cx="6096000" cy="5293757"/>
+            <a:off x="311258" y="6256219"/>
+            <a:ext cx="11740675" cy="369332"/>
           </a:xfrm>
           <a:prstGeom prst="rect">
             <a:avLst/>
           </a:prstGeom>
         </p:spPr>
         <p:txBody>
-          <a:bodyPr>
+          <a:bodyPr wrap="square">
             <a:spAutoFit/>
           </a:bodyPr>
           <a:lstStyle/>
           <a:p>
             <a:r>
-              <a:rPr lang="zh-CN" altLang="en-US" sz="2000" b="1" dirty="0" smtClean="0">
-                <a:solidFill>
-                  <a:srgbClr val="0000FF"/>
-                </a:solidFill>
+              <a:rPr lang="en-US" altLang="zh-CN" dirty="0">
+                <a:hlinkClick r:id="rId3"/>
               </a:rPr>
-              <a:t>*settings</a:t>
-            </a:r>
-            <a:endParaRPr lang="zh-CN" altLang="en-US" sz="2000" dirty="0" smtClean="0"/>
-          </a:p>
-          <a:p>
-            <a:r>
-              <a:rPr lang="zh-CN" altLang="en-US" sz="2000" dirty="0" smtClean="0">
-                <a:solidFill>
-                  <a:schemeClr val="accent2"/>
-                </a:solidFill>
+              <a:t>http://stackoverflow.com/questions/6265278/whats-the-exact-differences-between-jsch-channelexec-and-</a:t>
+            </a:r>
+            <a:r>
+              <a:rPr lang="en-US" altLang="zh-CN" dirty="0" smtClean="0">
+                <a:hlinkClick r:id="rId3"/>
               </a:rPr>
-              <a:t>excludeLinePattern</a:t>
-            </a:r>
-            <a:r>
-              <a:rPr lang="zh-CN" altLang="en-US" sz="2000" dirty="0" smtClean="0"/>
-              <a:t>= </a:t>
-            </a:r>
-            <a:r>
-              <a:rPr lang="en-US" altLang="zh-CN" sz="2000" dirty="0" smtClean="0"/>
-              <a:t>^\||^--</a:t>
-            </a:r>
-            <a:endParaRPr lang="zh-CN" altLang="en-US" sz="2000" dirty="0" smtClean="0"/>
-          </a:p>
-          <a:p>
-            <a:endParaRPr lang="zh-CN" altLang="en-US" sz="2000" dirty="0" smtClean="0"/>
-          </a:p>
-          <a:p>
-            <a:r>
-              <a:rPr lang="zh-CN" altLang="en-US" sz="2000" b="1" dirty="0">
-                <a:solidFill>
-                  <a:srgbClr val="0000FF"/>
-                </a:solidFill>
-              </a:rPr>
-              <a:t>*hosts</a:t>
-            </a:r>
-          </a:p>
-          <a:p>
-            <a:r>
-              <a:rPr lang="zh-CN" altLang="en-US" sz="2000" dirty="0" smtClean="0"/>
-              <a:t>10.142.194.155 webapp in</a:t>
-            </a:r>
-            <a:r>
-              <a:rPr lang="en-US" altLang="zh-CN" sz="2000" dirty="0" err="1" smtClean="0"/>
-              <a:t>ddf</a:t>
-            </a:r>
-            <a:r>
-              <a:rPr lang="zh-CN" altLang="en-US" sz="2000" dirty="0" smtClean="0"/>
-              <a:t>6c</a:t>
-            </a:r>
-          </a:p>
-          <a:p>
-            <a:r>
-              <a:rPr lang="zh-CN" altLang="en-US" sz="2000" dirty="0" smtClean="0"/>
-              <a:t>10.142.194.156</a:t>
-            </a:r>
-          </a:p>
-          <a:p>
-            <a:r>
-              <a:rPr lang="zh-CN" altLang="en-US" sz="2000" dirty="0" smtClean="0"/>
-              <a:t>10.142.194.157</a:t>
-            </a:r>
-          </a:p>
-          <a:p>
-            <a:r>
-              <a:rPr lang="en-US" altLang="zh-CN" sz="2000" dirty="0" smtClean="0"/>
-              <a:t># </a:t>
-            </a:r>
-            <a:r>
-              <a:rPr lang="zh-CN" altLang="en-US" sz="2000" dirty="0" smtClean="0"/>
-              <a:t>只列一部分</a:t>
-            </a:r>
-            <a:endParaRPr lang="en-US" altLang="zh-CN" sz="2000" dirty="0" smtClean="0"/>
-          </a:p>
-          <a:p>
-            <a:endParaRPr lang="zh-CN" altLang="en-US" sz="2000" dirty="0" smtClean="0"/>
-          </a:p>
-          <a:p>
-            <a:r>
-              <a:rPr lang="zh-CN" altLang="en-US" sz="2000" b="1" dirty="0">
-                <a:solidFill>
-                  <a:srgbClr val="0000FF"/>
-                </a:solidFill>
-              </a:rPr>
-              <a:t>*operations</a:t>
-            </a:r>
-          </a:p>
-          <a:p>
-            <a:r>
-              <a:rPr lang="zh-CN" altLang="en-US" sz="2000" dirty="0" smtClean="0"/>
-              <a:t>pkill -f flume</a:t>
-            </a:r>
-          </a:p>
-          <a:p>
-            <a:r>
-              <a:rPr lang="zh-CN" altLang="en-US" sz="2000" dirty="0" smtClean="0"/>
-              <a:t>rm -fr n3r-flume-1.1-dist</a:t>
-            </a:r>
-          </a:p>
-          <a:p>
-            <a:r>
-              <a:rPr lang="zh-CN" altLang="en-US" sz="2000" dirty="0">
-                <a:solidFill>
-                  <a:schemeClr val="accent2"/>
-                </a:solidFill>
-              </a:rPr>
-              <a:t>[sftp] </a:t>
-            </a:r>
-            <a:r>
-              <a:rPr lang="zh-CN" altLang="en-US" sz="2000" dirty="0" smtClean="0"/>
-              <a:t>put ../n3r-flume-1.1-dist.tar.gz .</a:t>
-            </a:r>
-          </a:p>
-          <a:p>
-            <a:r>
-              <a:rPr lang="zh-CN" altLang="en-US" sz="2000" dirty="0" smtClean="0"/>
-              <a:t>tar zxf n3r-flume-1.1-dist.tar.gz</a:t>
-            </a:r>
-          </a:p>
-          <a:p>
-            <a:r>
-              <a:rPr lang="zh-CN" altLang="en-US" sz="2000" dirty="0" smtClean="0"/>
-              <a:t>rm n3r-flume-1.1-dist.tar.gz</a:t>
-            </a:r>
-          </a:p>
-          <a:p>
-            <a:r>
-              <a:rPr lang="zh-CN" altLang="en-US" sz="2000" dirty="0" smtClean="0"/>
-              <a:t>cd n3r-flume-1.1-dist</a:t>
-            </a:r>
-          </a:p>
-          <a:p>
-            <a:r>
-              <a:rPr lang="zh-CN" altLang="en-US" sz="2000" dirty="0" smtClean="0"/>
-              <a:t>nohup java -jar n3r-flume-1.1.jar -i &gt; /dev/null &amp;</a:t>
-            </a:r>
-            <a:endParaRPr lang="zh-CN" altLang="en-US" sz="2000" dirty="0"/>
+              <a:t>channelshell</a:t>
+            </a:r>
+            <a:r>
+              <a:rPr lang="zh-CN" altLang="en-US" dirty="0" smtClean="0"/>
+              <a:t>  </a:t>
+            </a:r>
+            <a:endParaRPr lang="zh-CN" altLang="en-US" dirty="0"/>
           </a:p>
         </p:txBody>
       </p:sp>
     </p:spTree>
     <p:extLst>
       <p:ext uri="{BB962C8B-B14F-4D97-AF65-F5344CB8AC3E}">
-        <p14:creationId xmlns:p14="http://schemas.microsoft.com/office/powerpoint/2010/main" val="2334164420"/>
+        <p14:creationId xmlns:p14="http://schemas.microsoft.com/office/powerpoint/2010/main" val="2823824448"/>
       </p:ext>
     </p:extLst>
   </p:cSld>
   <p:clrMapOvr>
     <a:masterClrMapping/>
   </p:clrMapOvr>
-  <p:timing>
-    <p:tnLst>
-      <p:par>
-        <p:cTn id="1" dur="indefinite" restart="never" nodeType="tmRoot">
-          <p:childTnLst>
-            <p:seq concurrent="1" nextAc="seek">
-              <p:cTn id="2" dur="indefinite" nodeType="mainSeq">
-                <p:childTnLst>
-                  <p:par>
-                    <p:cTn id="3" fill="hold">
-                      <p:stCondLst>
-                        <p:cond delay="indefinite"/>
-                      </p:stCondLst>
-                      <p:childTnLst>
-                        <p:par>
-                          <p:cTn id="4" fill="hold">
-                            <p:stCondLst>
-                              <p:cond delay="0"/>
-                            </p:stCondLst>
-                            <p:childTnLst>
-                              <p:par>
-                                <p:cTn id="5" presetID="2" presetClass="entr" presetSubtype="4" fill="hold" grpId="0" nodeType="clickEffect">
-                                  <p:stCondLst>
-                                    <p:cond delay="0"/>
-                                  </p:stCondLst>
-                                  <p:childTnLst>
-                                    <p:set>
-                                      <p:cBhvr>
-                                        <p:cTn id="6" dur="1" fill="hold">
-                                          <p:stCondLst>
-                                            <p:cond delay="0"/>
-                                          </p:stCondLst>
-                                        </p:cTn>
-                                        <p:tgtEl>
-                                          <p:spTgt spid="4"/>
-                                        </p:tgtEl>
-                                        <p:attrNameLst>
-                                          <p:attrName>style.visibility</p:attrName>
-                                        </p:attrNameLst>
-                                      </p:cBhvr>
-                                      <p:to>
-                                        <p:strVal val="visible"/>
-                                      </p:to>
-                                    </p:set>
-                                    <p:anim calcmode="lin" valueType="num">
-                                      <p:cBhvr additive="base">
-                                        <p:cTn id="7" dur="500" fill="hold"/>
-                                        <p:tgtEl>
-                                          <p:spTgt spid="4"/>
-                                        </p:tgtEl>
-                                        <p:attrNameLst>
-                                          <p:attrName>ppt_x</p:attrName>
-                                        </p:attrNameLst>
-                                      </p:cBhvr>
-                                      <p:tavLst>
-                                        <p:tav tm="0">
-                                          <p:val>
-                                            <p:strVal val="#ppt_x"/>
-                                          </p:val>
-                                        </p:tav>
-                                        <p:tav tm="100000">
-                                          <p:val>
-                                            <p:strVal val="#ppt_x"/>
-                                          </p:val>
-                                        </p:tav>
-                                      </p:tavLst>
-                                    </p:anim>
-                                    <p:anim calcmode="lin" valueType="num">
-                                      <p:cBhvr additive="base">
-                                        <p:cTn id="8" dur="500" fill="hold"/>
-                                        <p:tgtEl>
-                                          <p:spTgt spid="4"/>
-                                        </p:tgtEl>
-                                        <p:attrNameLst>
-                                          <p:attrName>ppt_y</p:attrName>
-                                        </p:attrNameLst>
-                                      </p:cBhvr>
-                                      <p:tavLst>
-                                        <p:tav tm="0">
-                                          <p:val>
-                                            <p:strVal val="1+#ppt_h/2"/>
-                                          </p:val>
-                                        </p:tav>
-                                        <p:tav tm="100000">
-                                          <p:val>
-                                            <p:strVal val="#ppt_y"/>
-                                          </p:val>
-                                        </p:tav>
-                                      </p:tavLst>
-                                    </p:anim>
-                                  </p:childTnLst>
-                                </p:cTn>
-                              </p:par>
-                            </p:childTnLst>
-                          </p:cTn>
-                        </p:par>
-                      </p:childTnLst>
-                    </p:cTn>
-                  </p:par>
-                </p:childTnLst>
-              </p:cTn>
-              <p:prevCondLst>
-                <p:cond evt="onPrev" delay="0">
-                  <p:tgtEl>
-                    <p:sldTgt/>
-                  </p:tgtEl>
-                </p:cond>
-              </p:prevCondLst>
-              <p:nextCondLst>
-                <p:cond evt="onNext" delay="0">
-                  <p:tgtEl>
-                    <p:sldTgt/>
-                  </p:tgtEl>
-                </p:cond>
-              </p:nextCondLst>
-            </p:seq>
-          </p:childTnLst>
-        </p:cTn>
-      </p:par>
-    </p:tnLst>
-    <p:bldLst>
-      <p:bldP spid="4" grpId="0"/>
-    </p:bldLst>
-  </p:timing>
 </p:sld>
 </file>
 
@@ -4845,7 +5504,12 @@
             <p:ph type="title"/>
           </p:nvPr>
         </p:nvSpPr>
-        <p:spPr/>
+        <p:spPr>
+          <a:xfrm>
+            <a:off x="838200" y="365125"/>
+            <a:ext cx="11353800" cy="1325563"/>
+          </a:xfrm>
+        </p:spPr>
         <p:txBody>
           <a:bodyPr/>
           <a:lstStyle/>
@@ -4856,21 +5520,36 @@
             </a:r>
             <a:r>
               <a:rPr lang="en-US" altLang="zh-CN" dirty="0" smtClean="0"/>
-              <a:t>2</a:t>
-            </a:r>
-            <a:r>
-              <a:rPr lang="zh-CN" altLang="en-US" dirty="0" smtClean="0"/>
-              <a:t>：在</a:t>
-            </a:r>
-            <a:r>
-              <a:rPr lang="en-US" altLang="zh-CN" dirty="0" smtClean="0"/>
-              <a:t>&gt;3</a:t>
-            </a:r>
-            <a:r>
-              <a:rPr lang="zh-CN" altLang="en-US" dirty="0" smtClean="0"/>
-              <a:t>台机器找接口报文</a:t>
-            </a:r>
-            <a:endParaRPr lang="zh-CN" altLang="en-US" dirty="0"/>
+              <a:t>1</a:t>
+            </a:r>
+            <a:r>
+              <a:rPr lang="zh-CN" altLang="en-US" dirty="0" smtClean="0"/>
+              <a:t>：商城</a:t>
+            </a:r>
+            <a:r>
+              <a:rPr lang="en-US" altLang="zh-CN" dirty="0" smtClean="0"/>
+              <a:t>25</a:t>
+            </a:r>
+            <a:r>
+              <a:rPr lang="zh-CN" altLang="en-US" dirty="0" smtClean="0"/>
+              <a:t>台主机部署</a:t>
+            </a:r>
+            <a:r>
+              <a:rPr lang="en-US" altLang="zh-CN" dirty="0" smtClean="0"/>
+              <a:t>flume</a:t>
+            </a:r>
+            <a:r>
+              <a:rPr lang="zh-CN" altLang="en-US" dirty="0" smtClean="0"/>
+              <a:t>的</a:t>
+            </a:r>
+            <a:r>
+              <a:rPr lang="en-US" altLang="zh-CN" dirty="0" err="1" smtClean="0"/>
+              <a:t>sshe</a:t>
+            </a:r>
+            <a:r>
+              <a:rPr lang="zh-CN" altLang="en-US" dirty="0"/>
+              <a:t>配置</a:t>
+            </a:r>
           </a:p>
         </p:txBody>
       </p:sp>
@@ -4883,14 +5562,14 @@
         <p:spPr>
           <a:xfrm>
             <a:off x="838200" y="1516943"/>
-            <a:ext cx="6096000" cy="4708981"/>
+            <a:ext cx="9632540" cy="5293757"/>
           </a:xfrm>
           <a:prstGeom prst="rect">
             <a:avLst/>
           </a:prstGeom>
         </p:spPr>
         <p:txBody>
-          <a:bodyPr>
+          <a:bodyPr wrap="square">
             <a:spAutoFit/>
           </a:bodyPr>
           <a:lstStyle/>
@@ -4907,12 +5586,12 @@
           </a:p>
           <a:p>
             <a:r>
-              <a:rPr lang="en-US" altLang="zh-CN" sz="2000" dirty="0" smtClean="0">
+              <a:rPr lang="zh-CN" altLang="en-US" sz="2000" dirty="0" smtClean="0">
                 <a:solidFill>
                   <a:schemeClr val="accent2"/>
                 </a:solidFill>
               </a:rPr>
-              <a:t>charset</a:t>
+              <a:t>excludeLinePattern</a:t>
             </a:r>
             <a:r>
               <a:rPr lang="zh-CN" altLang="en-US" sz="2000" dirty="0" smtClean="0"/>
@@ -4920,7 +5599,7 @@
             </a:r>
             <a:r>
               <a:rPr lang="en-US" altLang="zh-CN" sz="2000" dirty="0" smtClean="0"/>
-              <a:t>GBK</a:t>
+              <a:t>^\||^--</a:t>
             </a:r>
             <a:endParaRPr lang="zh-CN" altLang="en-US" sz="2000" dirty="0" smtClean="0"/>
           </a:p>
@@ -4979,7 +5658,7 @@
           </a:p>
           <a:p>
             <a:r>
-              <a:rPr lang="zh-CN" altLang="en-US" sz="2000" b="1" dirty="0" smtClean="0">
+              <a:rPr lang="zh-CN" altLang="en-US" sz="2000" b="1" dirty="0">
                 <a:solidFill>
                   <a:srgbClr val="0000FF"/>
                 </a:solidFill>
@@ -4989,71 +5668,61 @@
           </a:p>
           <a:p>
             <a:r>
-              <a:rPr lang="en-US" altLang="zh-CN" sz="2000" dirty="0" smtClean="0"/>
-              <a:t>cd xxx/log</a:t>
-            </a:r>
-          </a:p>
-          <a:p>
-            <a:r>
-              <a:rPr lang="en-US" altLang="zh-CN" sz="2000" dirty="0" err="1" smtClean="0"/>
-              <a:t>grep</a:t>
-            </a:r>
-            <a:r>
-              <a:rPr lang="en-US" altLang="zh-CN" sz="2000" dirty="0" smtClean="0"/>
-              <a:t> </a:t>
-            </a:r>
-            <a:r>
-              <a:rPr lang="en-US" altLang="zh-CN" sz="2000" dirty="0" smtClean="0">
+              <a:rPr lang="zh-CN" altLang="en-US" sz="2000" dirty="0" smtClean="0"/>
+              <a:t>pkill -f flume</a:t>
+            </a:r>
+          </a:p>
+          <a:p>
+            <a:r>
+              <a:rPr lang="zh-CN" altLang="en-US" sz="2000" dirty="0" smtClean="0"/>
+              <a:t>rm -fr n3r-flume-1.1-dist</a:t>
+            </a:r>
+          </a:p>
+          <a:p>
+            <a:r>
+              <a:rPr lang="zh-CN" altLang="en-US" sz="2000" dirty="0">
                 <a:solidFill>
-                  <a:srgbClr val="FF0000"/>
+                  <a:schemeClr val="accent2"/>
                 </a:solidFill>
               </a:rPr>
-              <a:t>18602506990</a:t>
-            </a:r>
-            <a:r>
-              <a:rPr lang="en-US" altLang="zh-CN" sz="2000" dirty="0" smtClean="0"/>
-              <a:t> *.log</a:t>
-            </a:r>
-          </a:p>
-          <a:p>
-            <a:endParaRPr lang="en-US" altLang="zh-CN" sz="2000" dirty="0"/>
-          </a:p>
-          <a:p>
-            <a:r>
-              <a:rPr lang="en-US" altLang="zh-CN" sz="2000" b="1" dirty="0">
-                <a:solidFill>
-                  <a:srgbClr val="0000FF"/>
-                </a:solidFill>
-              </a:rPr>
-              <a:t>*</a:t>
-            </a:r>
-            <a:r>
-              <a:rPr lang="en-US" altLang="zh-CN" sz="2000" b="1" dirty="0" smtClean="0">
-                <a:solidFill>
-                  <a:srgbClr val="0000FF"/>
-                </a:solidFill>
-              </a:rPr>
-              <a:t>collectors</a:t>
-            </a:r>
-            <a:endParaRPr lang="en-US" altLang="zh-CN" sz="2000" b="1" dirty="0">
-              <a:solidFill>
-                <a:srgbClr val="0000FF"/>
-              </a:solidFill>
-            </a:endParaRPr>
-          </a:p>
-          <a:p>
-            <a:r>
-              <a:rPr lang="en-US" altLang="zh-CN" sz="2000" dirty="0" smtClean="0"/>
-              <a:t>[contains] .log:</a:t>
-            </a:r>
-            <a:endParaRPr lang="zh-CN" altLang="en-US" sz="2000" dirty="0" smtClean="0"/>
+              <a:t>[sftp] </a:t>
+            </a:r>
+            <a:r>
+              <a:rPr lang="zh-CN" altLang="en-US" sz="2000" dirty="0" smtClean="0"/>
+              <a:t>put ../n3r-flume-1.1-dist.tar.gz .</a:t>
+            </a:r>
+          </a:p>
+          <a:p>
+            <a:r>
+              <a:rPr lang="zh-CN" altLang="en-US" sz="2000" dirty="0" smtClean="0"/>
+              <a:t>tar zxf n3r-flume-1.1-dist.tar.gz</a:t>
+            </a:r>
+          </a:p>
+          <a:p>
+            <a:r>
+              <a:rPr lang="zh-CN" altLang="en-US" sz="2000" dirty="0" smtClean="0"/>
+              <a:t>rm n3r-flume-1.1-dist.tar.gz</a:t>
+            </a:r>
+          </a:p>
+          <a:p>
+            <a:r>
+              <a:rPr lang="zh-CN" altLang="en-US" sz="2000" dirty="0" smtClean="0"/>
+              <a:t>cd n3r-flume-1.1-dist</a:t>
+            </a:r>
+          </a:p>
+          <a:p>
+            <a:r>
+              <a:rPr lang="zh-CN" altLang="en-US" sz="2000" dirty="0" smtClean="0"/>
+              <a:t>nohup java -jar n3r-flume-1.1.jar -i &gt; /dev/null &amp;</a:t>
+            </a:r>
+            <a:endParaRPr lang="zh-CN" altLang="en-US" sz="2000" dirty="0"/>
           </a:p>
         </p:txBody>
       </p:sp>
     </p:spTree>
     <p:extLst>
       <p:ext uri="{BB962C8B-B14F-4D97-AF65-F5344CB8AC3E}">
-        <p14:creationId xmlns:p14="http://schemas.microsoft.com/office/powerpoint/2010/main" val="2095119354"/>
+        <p14:creationId xmlns:p14="http://schemas.microsoft.com/office/powerpoint/2010/main" val="2334164420"/>
       </p:ext>
     </p:extLst>
   </p:cSld>
@@ -5063,7 +5732,7 @@
   <p:timing>
     <p:tnLst>
       <p:par>
-        <p:cTn id="1" dur="indefinite" restart="never" nodeType="tmRoot">
+        <p:cTn xmlns:p14="http://schemas.microsoft.com/office/powerpoint/2010/main" id="1" dur="indefinite" restart="never" nodeType="tmRoot">
           <p:childTnLst>
             <p:seq concurrent="1" nextAc="seek">
               <p:cTn id="2" dur="indefinite" nodeType="mainSeq">
@@ -5206,6 +5875,375 @@
       </p:grpSpPr>
       <p:sp>
         <p:nvSpPr>
+          <p:cNvPr id="2" name="标题 1"/>
+          <p:cNvSpPr>
+            <a:spLocks noGrp="1"/>
+          </p:cNvSpPr>
+          <p:nvPr>
+            <p:ph type="title"/>
+          </p:nvPr>
+        </p:nvSpPr>
+        <p:spPr/>
+        <p:txBody>
+          <a:bodyPr/>
+          <a:lstStyle/>
+          <a:p>
+            <a:r>
+              <a:rPr lang="zh-CN" altLang="en-US" dirty="0" smtClean="0"/>
+              <a:t>演示</a:t>
+            </a:r>
+            <a:r>
+              <a:rPr lang="en-US" altLang="zh-CN" dirty="0" smtClean="0"/>
+              <a:t>2</a:t>
+            </a:r>
+            <a:r>
+              <a:rPr lang="zh-CN" altLang="en-US" dirty="0" smtClean="0"/>
+              <a:t>：在</a:t>
+            </a:r>
+            <a:r>
+              <a:rPr lang="en-US" altLang="zh-CN" dirty="0" smtClean="0"/>
+              <a:t>&gt;3</a:t>
+            </a:r>
+            <a:r>
+              <a:rPr lang="zh-CN" altLang="en-US" dirty="0" smtClean="0"/>
+              <a:t>台机器找接口报文</a:t>
+            </a:r>
+            <a:endParaRPr lang="zh-CN" altLang="en-US" dirty="0"/>
+          </a:p>
+        </p:txBody>
+      </p:sp>
+      <p:sp>
+        <p:nvSpPr>
+          <p:cNvPr id="4" name="矩形 3"/>
+          <p:cNvSpPr/>
+          <p:nvPr/>
+        </p:nvSpPr>
+        <p:spPr>
+          <a:xfrm>
+            <a:off x="838200" y="1516943"/>
+            <a:ext cx="6096000" cy="4708981"/>
+          </a:xfrm>
+          <a:prstGeom prst="rect">
+            <a:avLst/>
+          </a:prstGeom>
+        </p:spPr>
+        <p:txBody>
+          <a:bodyPr>
+            <a:spAutoFit/>
+          </a:bodyPr>
+          <a:lstStyle/>
+          <a:p>
+            <a:r>
+              <a:rPr lang="zh-CN" altLang="en-US" sz="2000" b="1" dirty="0" smtClean="0">
+                <a:solidFill>
+                  <a:srgbClr val="0000FF"/>
+                </a:solidFill>
+              </a:rPr>
+              <a:t>*settings</a:t>
+            </a:r>
+            <a:endParaRPr lang="zh-CN" altLang="en-US" sz="2000" dirty="0" smtClean="0"/>
+          </a:p>
+          <a:p>
+            <a:r>
+              <a:rPr lang="en-US" altLang="zh-CN" sz="2000" dirty="0" smtClean="0">
+                <a:solidFill>
+                  <a:schemeClr val="accent2"/>
+                </a:solidFill>
+              </a:rPr>
+              <a:t>charset</a:t>
+            </a:r>
+            <a:r>
+              <a:rPr lang="zh-CN" altLang="en-US" sz="2000" dirty="0" smtClean="0"/>
+              <a:t>= </a:t>
+            </a:r>
+            <a:r>
+              <a:rPr lang="en-US" altLang="zh-CN" sz="2000" dirty="0" smtClean="0"/>
+              <a:t>GBK</a:t>
+            </a:r>
+            <a:endParaRPr lang="zh-CN" altLang="en-US" sz="2000" dirty="0" smtClean="0"/>
+          </a:p>
+          <a:p>
+            <a:endParaRPr lang="zh-CN" altLang="en-US" sz="2000" dirty="0" smtClean="0"/>
+          </a:p>
+          <a:p>
+            <a:r>
+              <a:rPr lang="zh-CN" altLang="en-US" sz="2000" b="1" dirty="0">
+                <a:solidFill>
+                  <a:srgbClr val="0000FF"/>
+                </a:solidFill>
+              </a:rPr>
+              <a:t>*hosts</a:t>
+            </a:r>
+          </a:p>
+          <a:p>
+            <a:r>
+              <a:rPr lang="zh-CN" altLang="en-US" sz="2000" dirty="0" smtClean="0"/>
+              <a:t>10.142.194.155 webapp in</a:t>
+            </a:r>
+            <a:r>
+              <a:rPr lang="en-US" altLang="zh-CN" sz="2000" dirty="0" err="1" smtClean="0"/>
+              <a:t>ddf</a:t>
+            </a:r>
+            <a:r>
+              <a:rPr lang="zh-CN" altLang="en-US" sz="2000" dirty="0" smtClean="0"/>
+              <a:t>6c</a:t>
+            </a:r>
+          </a:p>
+          <a:p>
+            <a:r>
+              <a:rPr lang="zh-CN" altLang="en-US" sz="2000" dirty="0" smtClean="0"/>
+              <a:t>10.142.194.156</a:t>
+            </a:r>
+          </a:p>
+          <a:p>
+            <a:r>
+              <a:rPr lang="zh-CN" altLang="en-US" sz="2000" dirty="0" smtClean="0"/>
+              <a:t>10.142.194.157</a:t>
+            </a:r>
+          </a:p>
+          <a:p>
+            <a:r>
+              <a:rPr lang="en-US" altLang="zh-CN" sz="2000" dirty="0" smtClean="0"/>
+              <a:t># </a:t>
+            </a:r>
+            <a:r>
+              <a:rPr lang="zh-CN" altLang="en-US" sz="2000" dirty="0" smtClean="0"/>
+              <a:t>只列一部分</a:t>
+            </a:r>
+            <a:endParaRPr lang="en-US" altLang="zh-CN" sz="2000" dirty="0" smtClean="0"/>
+          </a:p>
+          <a:p>
+            <a:endParaRPr lang="zh-CN" altLang="en-US" sz="2000" dirty="0" smtClean="0"/>
+          </a:p>
+          <a:p>
+            <a:r>
+              <a:rPr lang="zh-CN" altLang="en-US" sz="2000" b="1" dirty="0" smtClean="0">
+                <a:solidFill>
+                  <a:srgbClr val="0000FF"/>
+                </a:solidFill>
+              </a:rPr>
+              <a:t>*operations</a:t>
+            </a:r>
+          </a:p>
+          <a:p>
+            <a:r>
+              <a:rPr lang="en-US" altLang="zh-CN" sz="2000" dirty="0" smtClean="0"/>
+              <a:t>cd xxx/log</a:t>
+            </a:r>
+          </a:p>
+          <a:p>
+            <a:r>
+              <a:rPr lang="en-US" altLang="zh-CN" sz="2000" dirty="0" err="1" smtClean="0"/>
+              <a:t>grep</a:t>
+            </a:r>
+            <a:r>
+              <a:rPr lang="en-US" altLang="zh-CN" sz="2000" dirty="0" smtClean="0"/>
+              <a:t> </a:t>
+            </a:r>
+            <a:r>
+              <a:rPr lang="en-US" altLang="zh-CN" sz="2000" dirty="0" smtClean="0">
+                <a:solidFill>
+                  <a:srgbClr val="FF0000"/>
+                </a:solidFill>
+              </a:rPr>
+              <a:t>18602506990</a:t>
+            </a:r>
+            <a:r>
+              <a:rPr lang="en-US" altLang="zh-CN" sz="2000" dirty="0" smtClean="0"/>
+              <a:t> *.log</a:t>
+            </a:r>
+          </a:p>
+          <a:p>
+            <a:endParaRPr lang="en-US" altLang="zh-CN" sz="2000" dirty="0"/>
+          </a:p>
+          <a:p>
+            <a:r>
+              <a:rPr lang="en-US" altLang="zh-CN" sz="2000" b="1" dirty="0">
+                <a:solidFill>
+                  <a:srgbClr val="0000FF"/>
+                </a:solidFill>
+              </a:rPr>
+              <a:t>*</a:t>
+            </a:r>
+            <a:r>
+              <a:rPr lang="en-US" altLang="zh-CN" sz="2000" b="1" dirty="0" smtClean="0">
+                <a:solidFill>
+                  <a:srgbClr val="0000FF"/>
+                </a:solidFill>
+              </a:rPr>
+              <a:t>collectors</a:t>
+            </a:r>
+            <a:endParaRPr lang="en-US" altLang="zh-CN" sz="2000" b="1" dirty="0">
+              <a:solidFill>
+                <a:srgbClr val="0000FF"/>
+              </a:solidFill>
+            </a:endParaRPr>
+          </a:p>
+          <a:p>
+            <a:r>
+              <a:rPr lang="en-US" altLang="zh-CN" sz="2000" dirty="0" smtClean="0"/>
+              <a:t>[contains] .log:</a:t>
+            </a:r>
+            <a:endParaRPr lang="zh-CN" altLang="en-US" sz="2000" dirty="0" smtClean="0"/>
+          </a:p>
+        </p:txBody>
+      </p:sp>
+    </p:spTree>
+    <p:extLst>
+      <p:ext uri="{BB962C8B-B14F-4D97-AF65-F5344CB8AC3E}">
+        <p14:creationId xmlns:p14="http://schemas.microsoft.com/office/powerpoint/2010/main" val="2095119354"/>
+      </p:ext>
+    </p:extLst>
+  </p:cSld>
+  <p:clrMapOvr>
+    <a:masterClrMapping/>
+  </p:clrMapOvr>
+  <p:timing>
+    <p:tnLst>
+      <p:par>
+        <p:cTn xmlns:p14="http://schemas.microsoft.com/office/powerpoint/2010/main" id="1" dur="indefinite" restart="never" nodeType="tmRoot">
+          <p:childTnLst>
+            <p:seq concurrent="1" nextAc="seek">
+              <p:cTn id="2" dur="indefinite" nodeType="mainSeq">
+                <p:childTnLst>
+                  <p:par>
+                    <p:cTn id="3" fill="hold">
+                      <p:stCondLst>
+                        <p:cond delay="indefinite"/>
+                      </p:stCondLst>
+                      <p:childTnLst>
+                        <p:par>
+                          <p:cTn id="4" fill="hold">
+                            <p:stCondLst>
+                              <p:cond delay="0"/>
+                            </p:stCondLst>
+                            <p:childTnLst>
+                              <p:par>
+                                <p:cTn id="5" presetID="2" presetClass="entr" presetSubtype="4" fill="hold" grpId="0" nodeType="clickEffect">
+                                  <p:stCondLst>
+                                    <p:cond delay="0"/>
+                                  </p:stCondLst>
+                                  <p:childTnLst>
+                                    <p:set>
+                                      <p:cBhvr>
+                                        <p:cTn id="6" dur="1" fill="hold">
+                                          <p:stCondLst>
+                                            <p:cond delay="0"/>
+                                          </p:stCondLst>
+                                        </p:cTn>
+                                        <p:tgtEl>
+                                          <p:spTgt spid="4"/>
+                                        </p:tgtEl>
+                                        <p:attrNameLst>
+                                          <p:attrName>style.visibility</p:attrName>
+                                        </p:attrNameLst>
+                                      </p:cBhvr>
+                                      <p:to>
+                                        <p:strVal val="visible"/>
+                                      </p:to>
+                                    </p:set>
+                                    <p:anim calcmode="lin" valueType="num">
+                                      <p:cBhvr additive="base">
+                                        <p:cTn id="7" dur="500" fill="hold"/>
+                                        <p:tgtEl>
+                                          <p:spTgt spid="4"/>
+                                        </p:tgtEl>
+                                        <p:attrNameLst>
+                                          <p:attrName>ppt_x</p:attrName>
+                                        </p:attrNameLst>
+                                      </p:cBhvr>
+                                      <p:tavLst>
+                                        <p:tav tm="0">
+                                          <p:val>
+                                            <p:strVal val="#ppt_x"/>
+                                          </p:val>
+                                        </p:tav>
+                                        <p:tav tm="100000">
+                                          <p:val>
+                                            <p:strVal val="#ppt_x"/>
+                                          </p:val>
+                                        </p:tav>
+                                      </p:tavLst>
+                                    </p:anim>
+                                    <p:anim calcmode="lin" valueType="num">
+                                      <p:cBhvr additive="base">
+                                        <p:cTn id="8" dur="500" fill="hold"/>
+                                        <p:tgtEl>
+                                          <p:spTgt spid="4"/>
+                                        </p:tgtEl>
+                                        <p:attrNameLst>
+                                          <p:attrName>ppt_y</p:attrName>
+                                        </p:attrNameLst>
+                                      </p:cBhvr>
+                                      <p:tavLst>
+                                        <p:tav tm="0">
+                                          <p:val>
+                                            <p:strVal val="1+#ppt_h/2"/>
+                                          </p:val>
+                                        </p:tav>
+                                        <p:tav tm="100000">
+                                          <p:val>
+                                            <p:strVal val="#ppt_y"/>
+                                          </p:val>
+                                        </p:tav>
+                                      </p:tavLst>
+                                    </p:anim>
+                                  </p:childTnLst>
+                                </p:cTn>
+                              </p:par>
+                            </p:childTnLst>
+                          </p:cTn>
+                        </p:par>
+                      </p:childTnLst>
+                    </p:cTn>
+                  </p:par>
+                </p:childTnLst>
+              </p:cTn>
+              <p:prevCondLst>
+                <p:cond evt="onPrev" delay="0">
+                  <p:tgtEl>
+                    <p:sldTgt/>
+                  </p:tgtEl>
+                </p:cond>
+              </p:prevCondLst>
+              <p:nextCondLst>
+                <p:cond evt="onNext" delay="0">
+                  <p:tgtEl>
+                    <p:sldTgt/>
+                  </p:tgtEl>
+                </p:cond>
+              </p:nextCondLst>
+            </p:seq>
+          </p:childTnLst>
+        </p:cTn>
+      </p:par>
+    </p:tnLst>
+    <p:bldLst>
+      <p:bldP spid="4" grpId="0"/>
+    </p:bldLst>
+  </p:timing>
+</p:sld>
+</file>
+
+<file path=ppt/slides/slide16.xml><?xml version="1.0" encoding="utf-8"?>
+<p:sld xmlns:a="http://schemas.openxmlformats.org/drawingml/2006/main" xmlns:r="http://schemas.openxmlformats.org/officeDocument/2006/relationships" xmlns:p="http://schemas.openxmlformats.org/presentationml/2006/main">
+  <p:cSld>
+    <p:spTree>
+      <p:nvGrpSpPr>
+        <p:cNvPr id="1" name=""/>
+        <p:cNvGrpSpPr/>
+        <p:nvPr/>
+      </p:nvGrpSpPr>
+      <p:grpSpPr>
+        <a:xfrm>
+          <a:off x="0" y="0"/>
+          <a:ext cx="0" cy="0"/>
+          <a:chOff x="0" y="0"/>
+          <a:chExt cx="0" cy="0"/>
+        </a:xfrm>
+      </p:grpSpPr>
+      <p:sp>
+        <p:nvSpPr>
           <p:cNvPr id="4" name="文本框 3"/>
           <p:cNvSpPr txBox="1"/>
           <p:nvPr/>
@@ -5255,7 +6293,7 @@
   <p:timing>
     <p:tnLst>
       <p:par>
-        <p:cTn id="1" dur="indefinite" restart="never" nodeType="tmRoot"/>
+        <p:cTn xmlns:p14="http://schemas.microsoft.com/office/powerpoint/2010/main" id="1" dur="indefinite" restart="never" nodeType="tmRoot"/>
       </p:par>
     </p:tnLst>
   </p:timing>
@@ -5472,7 +6510,39 @@
                   <a:srgbClr val="FF0000"/>
                 </a:solidFill>
               </a:rPr>
-              <a:t> easy, sexy she</a:t>
+              <a:t> easy, </a:t>
+            </a:r>
+            <a:r>
+              <a:rPr lang="en-US" altLang="zh-CN" b="1" dirty="0" smtClean="0">
+                <a:solidFill>
+                  <a:srgbClr val="FF0000"/>
+                </a:solidFill>
+              </a:rPr>
+              <a:t>sexy</a:t>
+            </a:r>
+            <a:r>
+              <a:rPr lang="en-US" altLang="en-US" b="1" dirty="0" smtClean="0">
+                <a:solidFill>
+                  <a:srgbClr val="FF0000"/>
+                </a:solidFill>
+              </a:rPr>
+              <a:t>/slim/simple</a:t>
+            </a:r>
+            <a:r>
+              <a:rPr lang="en-US" altLang="zh-CN" b="1" dirty="0" smtClean="0">
+                <a:solidFill>
+                  <a:srgbClr val="FF0000"/>
+                </a:solidFill>
+              </a:rPr>
+              <a:t> </a:t>
+            </a:r>
+            <a:r>
+              <a:rPr lang="en-US" altLang="zh-CN" b="1" dirty="0" smtClean="0">
+                <a:solidFill>
+                  <a:srgbClr val="FF0000"/>
+                </a:solidFill>
+              </a:rPr>
+              <a:t>she</a:t>
             </a:r>
           </a:p>
           <a:p>
@@ -5502,7 +6572,7 @@
   <p:timing>
     <p:tnLst>
       <p:par>
-        <p:cTn id="1" dur="indefinite" restart="never" nodeType="tmRoot"/>
+        <p:cTn xmlns:p14="http://schemas.microsoft.com/office/powerpoint/2010/main" id="1" dur="indefinite" restart="never" nodeType="tmRoot"/>
       </p:par>
     </p:tnLst>
   </p:timing>
@@ -5667,7 +6737,7 @@
   <p:timing>
     <p:tnLst>
       <p:par>
-        <p:cTn id="1" dur="indefinite" restart="never" nodeType="tmRoot"/>
+        <p:cTn xmlns:p14="http://schemas.microsoft.com/office/powerpoint/2010/main" id="1" dur="indefinite" restart="never" nodeType="tmRoot"/>
       </p:par>
     </p:tnLst>
   </p:timing>
@@ -5819,7 +6889,7 @@
   <p:timing>
     <p:tnLst>
       <p:par>
-        <p:cTn id="1" dur="indefinite" restart="never" nodeType="tmRoot"/>
+        <p:cTn xmlns:p14="http://schemas.microsoft.com/office/powerpoint/2010/main" id="1" dur="indefinite" restart="never" nodeType="tmRoot"/>
       </p:par>
     </p:tnLst>
   </p:timing>
@@ -6173,7 +7243,7 @@
   <p:timing>
     <p:tnLst>
       <p:par>
-        <p:cTn id="1" dur="indefinite" restart="never" nodeType="tmRoot"/>
+        <p:cTn xmlns:p14="http://schemas.microsoft.com/office/powerpoint/2010/main" id="1" dur="indefinite" restart="never" nodeType="tmRoot"/>
       </p:par>
     </p:tnLst>
   </p:timing>
@@ -6393,7 +7463,7 @@
   <p:timing>
     <p:tnLst>
       <p:par>
-        <p:cTn id="1" dur="indefinite" restart="never" nodeType="tmRoot"/>
+        <p:cTn xmlns:p14="http://schemas.microsoft.com/office/powerpoint/2010/main" id="1" dur="indefinite" restart="never" nodeType="tmRoot"/>
       </p:par>
     </p:tnLst>
   </p:timing>
@@ -6929,7 +7999,7 @@
   <p:timing>
     <p:tnLst>
       <p:par>
-        <p:cTn id="1" dur="indefinite" restart="never" nodeType="tmRoot"/>
+        <p:cTn xmlns:p14="http://schemas.microsoft.com/office/powerpoint/2010/main" id="1" dur="indefinite" restart="never" nodeType="tmRoot"/>
       </p:par>
     </p:tnLst>
   </p:timing>
@@ -7161,7 +8231,7 @@
   <p:timing>
     <p:tnLst>
       <p:par>
-        <p:cTn id="1" dur="indefinite" restart="never" nodeType="tmRoot"/>
+        <p:cTn xmlns:p14="http://schemas.microsoft.com/office/powerpoint/2010/main" id="1" dur="indefinite" restart="never" nodeType="tmRoot"/>
       </p:par>
     </p:tnLst>
   </p:timing>
@@ -7377,7 +8447,7 @@
   <p:timing>
     <p:tnLst>
       <p:par>
-        <p:cTn id="1" dur="indefinite" restart="never" nodeType="tmRoot">
+        <p:cTn xmlns:p14="http://schemas.microsoft.com/office/powerpoint/2010/main" id="1" dur="indefinite" restart="never" nodeType="tmRoot">
           <p:childTnLst>
             <p:seq concurrent="1" nextAc="seek">
               <p:cTn id="2" dur="indefinite" nodeType="mainSeq">
@@ -8120,7 +9190,7 @@
     </a:clrScheme>
     <a:fontScheme name="Office">
       <a:majorFont>
-        <a:latin typeface="Calibri Light" panose="020F0302020204030204"/>
+        <a:latin typeface="Calibri Light"/>
         <a:ea typeface=""/>
         <a:cs typeface=""/>
         <a:font script="Jpan" typeface="ＭＳ Ｐゴシック"/>
@@ -8155,7 +9225,7 @@
         <a:font script="Geor" typeface="Sylfaen"/>
       </a:majorFont>
       <a:minorFont>
-        <a:latin typeface="Calibri" panose="020F0502020204030204"/>
+        <a:latin typeface="Calibri"/>
         <a:ea typeface=""/>
         <a:cs typeface=""/>
         <a:font script="Jpan" typeface="ＭＳ Ｐゴシック"/>
@@ -8332,8 +9402,328 @@
   <a:extraClrSchemeLst/>
   <a:extLst>
     <a:ext uri="{05A4C25C-085E-4340-85A3-A5531E510DB2}">
-      <thm15:themeFamily xmlns:thm15="http://schemas.microsoft.com/office/thememl/2012/main" name="Office Theme" id="{62F939B6-93AF-4DB8-9C6B-D6C7DFDC589F}" vid="{4A3C46E8-61CC-4603-A589-7422A47A8E4A}"/>
+      <thm15:themeFamily xmlns:thm15="http://schemas.microsoft.com/office/thememl/2012/main" xmlns="" name="Office Theme" id="{62F939B6-93AF-4DB8-9C6B-D6C7DFDC589F}" vid="{4A3C46E8-61CC-4603-A589-7422A47A8E4A}"/>
     </a:ext>
   </a:extLst>
 </a:theme>
+</file>
+
+<file path=ppt/theme/theme2.xml><?xml version="1.0" encoding="utf-8"?>
+<a:theme xmlns:a="http://schemas.openxmlformats.org/drawingml/2006/main" name="Office 主题">
+  <a:themeElements>
+    <a:clrScheme name="办公室">
+      <a:dk1>
+        <a:sysClr val="windowText" lastClr="000000"/>
+      </a:dk1>
+      <a:lt1>
+        <a:sysClr val="window" lastClr="FFFFFF"/>
+      </a:lt1>
+      <a:dk2>
+        <a:srgbClr val="1F497D"/>
+      </a:dk2>
+      <a:lt2>
+        <a:srgbClr val="EEECE1"/>
+      </a:lt2>
+      <a:accent1>
+        <a:srgbClr val="4F81BD"/>
+      </a:accent1>
+      <a:accent2>
+        <a:srgbClr val="C0504D"/>
+      </a:accent2>
+      <a:accent3>
+        <a:srgbClr val="9BBB59"/>
+      </a:accent3>
+      <a:accent4>
+        <a:srgbClr val="8064A2"/>
+      </a:accent4>
+      <a:accent5>
+        <a:srgbClr val="4BACC6"/>
+      </a:accent5>
+      <a:accent6>
+        <a:srgbClr val="F79646"/>
+      </a:accent6>
+      <a:hlink>
+        <a:srgbClr val="0000FF"/>
+      </a:hlink>
+      <a:folHlink>
+        <a:srgbClr val="800080"/>
+      </a:folHlink>
+    </a:clrScheme>
+    <a:fontScheme name="办公室">
+      <a:majorFont>
+        <a:latin typeface="Calibri"/>
+        <a:ea typeface=""/>
+        <a:cs typeface=""/>
+        <a:font script="Jpan" typeface="ＭＳ Ｐゴシック"/>
+        <a:font script="Hang" typeface="맑은 고딕"/>
+        <a:font script="Hans" typeface="宋体"/>
+        <a:font script="Hant" typeface="新細明體"/>
+        <a:font script="Arab" typeface="Times New Roman"/>
+        <a:font script="Hebr" typeface="Times New Roman"/>
+        <a:font script="Thai" typeface="Angsana New"/>
+        <a:font script="Ethi" typeface="Nyala"/>
+        <a:font script="Beng" typeface="Vrinda"/>
+        <a:font script="Gujr" typeface="Shruti"/>
+        <a:font script="Khmr" typeface="MoolBoran"/>
+        <a:font script="Knda" typeface="Tunga"/>
+        <a:font script="Guru" typeface="Raavi"/>
+        <a:font script="Cans" typeface="Euphemia"/>
+        <a:font script="Cher" typeface="Plantagenet Cherokee"/>
+        <a:font script="Yiii" typeface="Microsoft Yi Baiti"/>
+        <a:font script="Tibt" typeface="Microsoft Himalaya"/>
+        <a:font script="Thaa" typeface="MV Boli"/>
+        <a:font script="Deva" typeface="Mangal"/>
+        <a:font script="Telu" typeface="Gautami"/>
+        <a:font script="Taml" typeface="Latha"/>
+        <a:font script="Syrc" typeface="Estrangelo Edessa"/>
+        <a:font script="Orya" typeface="Kalinga"/>
+        <a:font script="Mlym" typeface="Kartika"/>
+        <a:font script="Laoo" typeface="DokChampa"/>
+        <a:font script="Sinh" typeface="Iskoola Pota"/>
+        <a:font script="Mong" typeface="Mongolian Baiti"/>
+        <a:font script="Viet" typeface="Times New Roman"/>
+        <a:font script="Uigh" typeface="Microsoft Uighur"/>
+        <a:font script="Geor" typeface="Sylfaen"/>
+      </a:majorFont>
+      <a:minorFont>
+        <a:latin typeface="Calibri"/>
+        <a:ea typeface=""/>
+        <a:cs typeface=""/>
+        <a:font script="Jpan" typeface="ＭＳ Ｐゴシック"/>
+        <a:font script="Hang" typeface="맑은 고딕"/>
+        <a:font script="Hans" typeface="宋体"/>
+        <a:font script="Hant" typeface="新細明體"/>
+        <a:font script="Arab" typeface="Arial"/>
+        <a:font script="Hebr" typeface="Arial"/>
+        <a:font script="Thai" typeface="Cordia New"/>
+        <a:font script="Ethi" typeface="Nyala"/>
+        <a:font script="Beng" typeface="Vrinda"/>
+        <a:font script="Gujr" typeface="Shruti"/>
+        <a:font script="Khmr" typeface="DaunPenh"/>
+        <a:font script="Knda" typeface="Tunga"/>
+        <a:font script="Guru" typeface="Raavi"/>
+        <a:font script="Cans" typeface="Euphemia"/>
+        <a:font script="Cher" typeface="Plantagenet Cherokee"/>
+        <a:font script="Yiii" typeface="Microsoft Yi Baiti"/>
+        <a:font script="Tibt" typeface="Microsoft Himalaya"/>
+        <a:font script="Thaa" typeface="MV Boli"/>
+        <a:font script="Deva" typeface="Mangal"/>
+        <a:font script="Telu" typeface="Gautami"/>
+        <a:font script="Taml" typeface="Latha"/>
+        <a:font script="Syrc" typeface="Estrangelo Edessa"/>
+        <a:font script="Orya" typeface="Kalinga"/>
+        <a:font script="Mlym" typeface="Kartika"/>
+        <a:font script="Laoo" typeface="DokChampa"/>
+        <a:font script="Sinh" typeface="Iskoola Pota"/>
+        <a:font script="Mong" typeface="Mongolian Baiti"/>
+        <a:font script="Viet" typeface="Arial"/>
+        <a:font script="Uigh" typeface="Microsoft Uighur"/>
+        <a:font script="Geor" typeface="Sylfaen"/>
+      </a:minorFont>
+    </a:fontScheme>
+    <a:fmtScheme name="办公室">
+      <a:fillStyleLst>
+        <a:solidFill>
+          <a:schemeClr val="phClr"/>
+        </a:solidFill>
+        <a:gradFill rotWithShape="1">
+          <a:gsLst>
+            <a:gs pos="0">
+              <a:schemeClr val="phClr">
+                <a:tint val="50000"/>
+                <a:satMod val="300000"/>
+              </a:schemeClr>
+            </a:gs>
+            <a:gs pos="35000">
+              <a:schemeClr val="phClr">
+                <a:tint val="37000"/>
+                <a:satMod val="300000"/>
+              </a:schemeClr>
+            </a:gs>
+            <a:gs pos="100000">
+              <a:schemeClr val="phClr">
+                <a:tint val="15000"/>
+                <a:satMod val="350000"/>
+              </a:schemeClr>
+            </a:gs>
+          </a:gsLst>
+          <a:lin ang="16200000" scaled="1"/>
+        </a:gradFill>
+        <a:gradFill rotWithShape="1">
+          <a:gsLst>
+            <a:gs pos="0">
+              <a:schemeClr val="phClr">
+                <a:tint val="100000"/>
+                <a:shade val="100000"/>
+                <a:satMod val="130000"/>
+              </a:schemeClr>
+            </a:gs>
+            <a:gs pos="100000">
+              <a:schemeClr val="phClr">
+                <a:tint val="50000"/>
+                <a:shade val="100000"/>
+                <a:satMod val="350000"/>
+              </a:schemeClr>
+            </a:gs>
+          </a:gsLst>
+          <a:lin ang="16200000" scaled="0"/>
+        </a:gradFill>
+      </a:fillStyleLst>
+      <a:lnStyleLst>
+        <a:ln w="9525" cap="flat" cmpd="sng" algn="ctr">
+          <a:solidFill>
+            <a:schemeClr val="phClr">
+              <a:shade val="95000"/>
+              <a:satMod val="105000"/>
+            </a:schemeClr>
+          </a:solidFill>
+          <a:prstDash val="solid"/>
+        </a:ln>
+        <a:ln w="25400" cap="flat" cmpd="sng" algn="ctr">
+          <a:solidFill>
+            <a:schemeClr val="phClr"/>
+          </a:solidFill>
+          <a:prstDash val="solid"/>
+        </a:ln>
+        <a:ln w="38100" cap="flat" cmpd="sng" algn="ctr">
+          <a:solidFill>
+            <a:schemeClr val="phClr"/>
+          </a:solidFill>
+          <a:prstDash val="solid"/>
+        </a:ln>
+      </a:lnStyleLst>
+      <a:effectStyleLst>
+        <a:effectStyle>
+          <a:effectLst>
+            <a:outerShdw blurRad="40000" dist="20000" dir="5400000" rotWithShape="0">
+              <a:srgbClr val="000000">
+                <a:alpha val="38000"/>
+              </a:srgbClr>
+            </a:outerShdw>
+          </a:effectLst>
+        </a:effectStyle>
+        <a:effectStyle>
+          <a:effectLst>
+            <a:outerShdw blurRad="40000" dist="23000" dir="5400000" rotWithShape="0">
+              <a:srgbClr val="000000">
+                <a:alpha val="35000"/>
+              </a:srgbClr>
+            </a:outerShdw>
+          </a:effectLst>
+        </a:effectStyle>
+        <a:effectStyle>
+          <a:effectLst>
+            <a:outerShdw blurRad="40000" dist="23000" dir="5400000" rotWithShape="0">
+              <a:srgbClr val="000000">
+                <a:alpha val="35000"/>
+              </a:srgbClr>
+            </a:outerShdw>
+          </a:effectLst>
+          <a:scene3d>
+            <a:camera prst="orthographicFront">
+              <a:rot lat="0" lon="0" rev="0"/>
+            </a:camera>
+            <a:lightRig rig="threePt" dir="t">
+              <a:rot lat="0" lon="0" rev="1200000"/>
+            </a:lightRig>
+          </a:scene3d>
+          <a:sp3d>
+            <a:bevelT w="63500" h="25400"/>
+          </a:sp3d>
+        </a:effectStyle>
+      </a:effectStyleLst>
+      <a:bgFillStyleLst>
+        <a:solidFill>
+          <a:schemeClr val="phClr"/>
+        </a:solidFill>
+        <a:gradFill rotWithShape="1">
+          <a:gsLst>
+            <a:gs pos="0">
+              <a:schemeClr val="phClr">
+                <a:tint val="40000"/>
+                <a:satMod val="350000"/>
+              </a:schemeClr>
+            </a:gs>
+            <a:gs pos="40000">
+              <a:schemeClr val="phClr">
+                <a:tint val="45000"/>
+                <a:shade val="99000"/>
+                <a:satMod val="350000"/>
+              </a:schemeClr>
+            </a:gs>
+            <a:gs pos="100000">
+              <a:schemeClr val="phClr">
+                <a:shade val="20000"/>
+                <a:satMod val="255000"/>
+              </a:schemeClr>
+            </a:gs>
+          </a:gsLst>
+          <a:path path="circle">
+            <a:fillToRect l="50000" t="-80000" r="50000" b="180000"/>
+          </a:path>
+        </a:gradFill>
+        <a:gradFill rotWithShape="1">
+          <a:gsLst>
+            <a:gs pos="0">
+              <a:schemeClr val="phClr">
+                <a:tint val="80000"/>
+                <a:satMod val="300000"/>
+              </a:schemeClr>
+            </a:gs>
+            <a:gs pos="100000">
+              <a:schemeClr val="phClr">
+                <a:shade val="30000"/>
+                <a:satMod val="200000"/>
+              </a:schemeClr>
+            </a:gs>
+          </a:gsLst>
+          <a:path path="circle">
+            <a:fillToRect l="50000" t="50000" r="50000" b="50000"/>
+          </a:path>
+        </a:gradFill>
+      </a:bgFillStyleLst>
+    </a:fmtScheme>
+  </a:themeElements>
+  <a:objectDefaults>
+    <a:spDef>
+      <a:spPr/>
+      <a:bodyPr/>
+      <a:lstStyle/>
+      <a:style>
+        <a:lnRef idx="1">
+          <a:schemeClr val="accent1"/>
+        </a:lnRef>
+        <a:fillRef idx="3">
+          <a:schemeClr val="accent1"/>
+        </a:fillRef>
+        <a:effectRef idx="2">
+          <a:schemeClr val="accent1"/>
+        </a:effectRef>
+        <a:fontRef idx="minor">
+          <a:schemeClr val="lt1"/>
+        </a:fontRef>
+      </a:style>
+    </a:spDef>
+    <a:lnDef>
+      <a:spPr/>
+      <a:bodyPr/>
+      <a:lstStyle/>
+      <a:style>
+        <a:lnRef idx="2">
+          <a:schemeClr val="accent1"/>
+        </a:lnRef>
+        <a:fillRef idx="0">
+          <a:schemeClr val="accent1"/>
+        </a:fillRef>
+        <a:effectRef idx="1">
+          <a:schemeClr val="accent1"/>
+        </a:effectRef>
+        <a:fontRef idx="minor">
+          <a:schemeClr val="tx1"/>
+        </a:fontRef>
+      </a:style>
+    </a:lnDef>
+  </a:objectDefaults>
+  <a:extraClrSchemeLst/>
+</a:theme>
 </file>
</xml_diff>